<commit_message>
algorithms for class exercises
</commit_message>
<xml_diff>
--- a/Algorithm for students 27_4_21.pptx
+++ b/Algorithm for students 27_4_21.pptx
@@ -5,9 +5,15 @@
     <p:sldMasterId id="2147483648" r:id="rId1"/>
   </p:sldMasterIdLst>
   <p:sldIdLst>
-    <p:sldId id="258" r:id="rId3"/>
-    <p:sldId id="259" r:id="rId4"/>
-    <p:sldId id="257" r:id="rId5"/>
+    <p:sldId id="258" r:id="rId2"/>
+    <p:sldId id="259" r:id="rId3"/>
+    <p:sldId id="257" r:id="rId4"/>
+    <p:sldId id="260" r:id="rId5"/>
+    <p:sldId id="262" r:id="rId6"/>
+    <p:sldId id="265" r:id="rId7"/>
+    <p:sldId id="263" r:id="rId8"/>
+    <p:sldId id="267" r:id="rId9"/>
+    <p:sldId id="268" r:id="rId10"/>
   </p:sldIdLst>
   <p:sldSz cx="12192000" cy="6858000"/>
   <p:notesSz cx="6858000" cy="9144000"/>
@@ -106,6 +112,11 @@
       </a:defRPr>
     </a:lvl9pPr>
   </p:defaultTextStyle>
+  <p:extLst>
+    <p:ext uri="{EFAFB233-063F-42B5-8137-9DF3F51BA10A}">
+      <p15:sldGuideLst xmlns:p15="http://schemas.microsoft.com/office/powerpoint/2012/main"/>
+    </p:ext>
+  </p:extLst>
 </p:presentation>
 </file>
 
@@ -240,6 +251,7 @@
           <a:p>
             <a:fld id="{63A1C593-65D0-4073-BCC9-577B9352EA97}" type="datetimeFigureOut">
               <a:rPr lang="en-US" smtClean="0"/>
+              <a:t>4/29/2021</a:t>
             </a:fld>
             <a:endParaRPr lang="en-US"/>
           </a:p>
@@ -281,6 +293,7 @@
           <a:p>
             <a:fld id="{9B618960-8005-486C-9A75-10CB2AAC16F9}" type="slidenum">
               <a:rPr lang="en-US" smtClean="0"/>
+              <a:t>‹#›</a:t>
             </a:fld>
             <a:endParaRPr lang="en-US"/>
           </a:p>
@@ -354,7 +367,6 @@
               <a:rPr lang="en-US" smtClean="0"/>
               <a:t>Click to edit Master text styles</a:t>
             </a:r>
-            <a:endParaRPr lang="en-US" smtClean="0"/>
           </a:p>
           <a:p>
             <a:pPr lvl="1"/>
@@ -362,7 +374,6 @@
               <a:rPr lang="en-US" smtClean="0"/>
               <a:t>Second level</a:t>
             </a:r>
-            <a:endParaRPr lang="en-US" smtClean="0"/>
           </a:p>
           <a:p>
             <a:pPr lvl="2"/>
@@ -370,7 +381,6 @@
               <a:rPr lang="en-US" smtClean="0"/>
               <a:t>Third level</a:t>
             </a:r>
-            <a:endParaRPr lang="en-US" smtClean="0"/>
           </a:p>
           <a:p>
             <a:pPr lvl="3"/>
@@ -378,7 +388,6 @@
               <a:rPr lang="en-US" smtClean="0"/>
               <a:t>Fourth level</a:t>
             </a:r>
-            <a:endParaRPr lang="en-US" smtClean="0"/>
           </a:p>
           <a:p>
             <a:pPr lvl="4"/>
@@ -407,6 +416,7 @@
           <a:p>
             <a:fld id="{63A1C593-65D0-4073-BCC9-577B9352EA97}" type="datetimeFigureOut">
               <a:rPr lang="en-US" smtClean="0"/>
+              <a:t>4/29/2021</a:t>
             </a:fld>
             <a:endParaRPr lang="en-US"/>
           </a:p>
@@ -448,6 +458,7 @@
           <a:p>
             <a:fld id="{9B618960-8005-486C-9A75-10CB2AAC16F9}" type="slidenum">
               <a:rPr lang="en-US" smtClean="0"/>
+              <a:t>‹#›</a:t>
             </a:fld>
             <a:endParaRPr lang="en-US"/>
           </a:p>
@@ -531,7 +542,6 @@
               <a:rPr lang="en-US" smtClean="0"/>
               <a:t>Click to edit Master text styles</a:t>
             </a:r>
-            <a:endParaRPr lang="en-US" smtClean="0"/>
           </a:p>
           <a:p>
             <a:pPr lvl="1"/>
@@ -539,7 +549,6 @@
               <a:rPr lang="en-US" smtClean="0"/>
               <a:t>Second level</a:t>
             </a:r>
-            <a:endParaRPr lang="en-US" smtClean="0"/>
           </a:p>
           <a:p>
             <a:pPr lvl="2"/>
@@ -547,7 +556,6 @@
               <a:rPr lang="en-US" smtClean="0"/>
               <a:t>Third level</a:t>
             </a:r>
-            <a:endParaRPr lang="en-US" smtClean="0"/>
           </a:p>
           <a:p>
             <a:pPr lvl="3"/>
@@ -555,7 +563,6 @@
               <a:rPr lang="en-US" smtClean="0"/>
               <a:t>Fourth level</a:t>
             </a:r>
-            <a:endParaRPr lang="en-US" smtClean="0"/>
           </a:p>
           <a:p>
             <a:pPr lvl="4"/>
@@ -584,6 +591,7 @@
           <a:p>
             <a:fld id="{63A1C593-65D0-4073-BCC9-577B9352EA97}" type="datetimeFigureOut">
               <a:rPr lang="en-US" smtClean="0"/>
+              <a:t>4/29/2021</a:t>
             </a:fld>
             <a:endParaRPr lang="en-US"/>
           </a:p>
@@ -625,6 +633,7 @@
           <a:p>
             <a:fld id="{9B618960-8005-486C-9A75-10CB2AAC16F9}" type="slidenum">
               <a:rPr lang="en-US" smtClean="0"/>
+              <a:t>‹#›</a:t>
             </a:fld>
             <a:endParaRPr lang="en-US"/>
           </a:p>
@@ -698,7 +707,6 @@
               <a:rPr lang="en-US" smtClean="0"/>
               <a:t>Click to edit Master text styles</a:t>
             </a:r>
-            <a:endParaRPr lang="en-US" smtClean="0"/>
           </a:p>
           <a:p>
             <a:pPr lvl="1"/>
@@ -706,7 +714,6 @@
               <a:rPr lang="en-US" smtClean="0"/>
               <a:t>Second level</a:t>
             </a:r>
-            <a:endParaRPr lang="en-US" smtClean="0"/>
           </a:p>
           <a:p>
             <a:pPr lvl="2"/>
@@ -714,7 +721,6 @@
               <a:rPr lang="en-US" smtClean="0"/>
               <a:t>Third level</a:t>
             </a:r>
-            <a:endParaRPr lang="en-US" smtClean="0"/>
           </a:p>
           <a:p>
             <a:pPr lvl="3"/>
@@ -722,7 +728,6 @@
               <a:rPr lang="en-US" smtClean="0"/>
               <a:t>Fourth level</a:t>
             </a:r>
-            <a:endParaRPr lang="en-US" smtClean="0"/>
           </a:p>
           <a:p>
             <a:pPr lvl="4"/>
@@ -751,6 +756,7 @@
           <a:p>
             <a:fld id="{63A1C593-65D0-4073-BCC9-577B9352EA97}" type="datetimeFigureOut">
               <a:rPr lang="en-US" smtClean="0"/>
+              <a:t>4/29/2021</a:t>
             </a:fld>
             <a:endParaRPr lang="en-US"/>
           </a:p>
@@ -792,6 +798,7 @@
           <a:p>
             <a:fld id="{9B618960-8005-486C-9A75-10CB2AAC16F9}" type="slidenum">
               <a:rPr lang="en-US" smtClean="0"/>
+              <a:t>‹#›</a:t>
             </a:fld>
             <a:endParaRPr lang="en-US"/>
           </a:p>
@@ -970,7 +977,6 @@
               <a:rPr lang="en-US" smtClean="0"/>
               <a:t>Click to edit Master text styles</a:t>
             </a:r>
-            <a:endParaRPr lang="en-US" smtClean="0"/>
           </a:p>
         </p:txBody>
       </p:sp>
@@ -991,6 +997,7 @@
           <a:p>
             <a:fld id="{63A1C593-65D0-4073-BCC9-577B9352EA97}" type="datetimeFigureOut">
               <a:rPr lang="en-US" smtClean="0"/>
+              <a:t>4/29/2021</a:t>
             </a:fld>
             <a:endParaRPr lang="en-US"/>
           </a:p>
@@ -1032,6 +1039,7 @@
           <a:p>
             <a:fld id="{9B618960-8005-486C-9A75-10CB2AAC16F9}" type="slidenum">
               <a:rPr lang="en-US" smtClean="0"/>
+              <a:t>‹#›</a:t>
             </a:fld>
             <a:endParaRPr lang="en-US"/>
           </a:p>
@@ -1110,7 +1118,6 @@
               <a:rPr lang="en-US" smtClean="0"/>
               <a:t>Click to edit Master text styles</a:t>
             </a:r>
-            <a:endParaRPr lang="en-US" smtClean="0"/>
           </a:p>
           <a:p>
             <a:pPr lvl="1"/>
@@ -1118,7 +1125,6 @@
               <a:rPr lang="en-US" smtClean="0"/>
               <a:t>Second level</a:t>
             </a:r>
-            <a:endParaRPr lang="en-US" smtClean="0"/>
           </a:p>
           <a:p>
             <a:pPr lvl="2"/>
@@ -1126,7 +1132,6 @@
               <a:rPr lang="en-US" smtClean="0"/>
               <a:t>Third level</a:t>
             </a:r>
-            <a:endParaRPr lang="en-US" smtClean="0"/>
           </a:p>
           <a:p>
             <a:pPr lvl="3"/>
@@ -1134,7 +1139,6 @@
               <a:rPr lang="en-US" smtClean="0"/>
               <a:t>Fourth level</a:t>
             </a:r>
-            <a:endParaRPr lang="en-US" smtClean="0"/>
           </a:p>
           <a:p>
             <a:pPr lvl="4"/>
@@ -1171,7 +1175,6 @@
               <a:rPr lang="en-US" smtClean="0"/>
               <a:t>Click to edit Master text styles</a:t>
             </a:r>
-            <a:endParaRPr lang="en-US" smtClean="0"/>
           </a:p>
           <a:p>
             <a:pPr lvl="1"/>
@@ -1179,7 +1182,6 @@
               <a:rPr lang="en-US" smtClean="0"/>
               <a:t>Second level</a:t>
             </a:r>
-            <a:endParaRPr lang="en-US" smtClean="0"/>
           </a:p>
           <a:p>
             <a:pPr lvl="2"/>
@@ -1187,7 +1189,6 @@
               <a:rPr lang="en-US" smtClean="0"/>
               <a:t>Third level</a:t>
             </a:r>
-            <a:endParaRPr lang="en-US" smtClean="0"/>
           </a:p>
           <a:p>
             <a:pPr lvl="3"/>
@@ -1195,7 +1196,6 @@
               <a:rPr lang="en-US" smtClean="0"/>
               <a:t>Fourth level</a:t>
             </a:r>
-            <a:endParaRPr lang="en-US" smtClean="0"/>
           </a:p>
           <a:p>
             <a:pPr lvl="4"/>
@@ -1224,6 +1224,7 @@
           <a:p>
             <a:fld id="{63A1C593-65D0-4073-BCC9-577B9352EA97}" type="datetimeFigureOut">
               <a:rPr lang="en-US" smtClean="0"/>
+              <a:t>4/29/2021</a:t>
             </a:fld>
             <a:endParaRPr lang="en-US"/>
           </a:p>
@@ -1265,6 +1266,7 @@
           <a:p>
             <a:fld id="{9B618960-8005-486C-9A75-10CB2AAC16F9}" type="slidenum">
               <a:rPr lang="en-US" smtClean="0"/>
+              <a:t>‹#›</a:t>
             </a:fld>
             <a:endParaRPr lang="en-US"/>
           </a:p>
@@ -1385,7 +1387,6 @@
               <a:rPr lang="en-US" smtClean="0"/>
               <a:t>Click to edit Master text styles</a:t>
             </a:r>
-            <a:endParaRPr lang="en-US" smtClean="0"/>
           </a:p>
         </p:txBody>
       </p:sp>
@@ -1414,7 +1415,6 @@
               <a:rPr lang="en-US" smtClean="0"/>
               <a:t>Click to edit Master text styles</a:t>
             </a:r>
-            <a:endParaRPr lang="en-US" smtClean="0"/>
           </a:p>
           <a:p>
             <a:pPr lvl="1"/>
@@ -1422,7 +1422,6 @@
               <a:rPr lang="en-US" smtClean="0"/>
               <a:t>Second level</a:t>
             </a:r>
-            <a:endParaRPr lang="en-US" smtClean="0"/>
           </a:p>
           <a:p>
             <a:pPr lvl="2"/>
@@ -1430,7 +1429,6 @@
               <a:rPr lang="en-US" smtClean="0"/>
               <a:t>Third level</a:t>
             </a:r>
-            <a:endParaRPr lang="en-US" smtClean="0"/>
           </a:p>
           <a:p>
             <a:pPr lvl="3"/>
@@ -1438,7 +1436,6 @@
               <a:rPr lang="en-US" smtClean="0"/>
               <a:t>Fourth level</a:t>
             </a:r>
-            <a:endParaRPr lang="en-US" smtClean="0"/>
           </a:p>
           <a:p>
             <a:pPr lvl="4"/>
@@ -1512,7 +1509,6 @@
               <a:rPr lang="en-US" smtClean="0"/>
               <a:t>Click to edit Master text styles</a:t>
             </a:r>
-            <a:endParaRPr lang="en-US" smtClean="0"/>
           </a:p>
         </p:txBody>
       </p:sp>
@@ -1541,7 +1537,6 @@
               <a:rPr lang="en-US" smtClean="0"/>
               <a:t>Click to edit Master text styles</a:t>
             </a:r>
-            <a:endParaRPr lang="en-US" smtClean="0"/>
           </a:p>
           <a:p>
             <a:pPr lvl="1"/>
@@ -1549,7 +1544,6 @@
               <a:rPr lang="en-US" smtClean="0"/>
               <a:t>Second level</a:t>
             </a:r>
-            <a:endParaRPr lang="en-US" smtClean="0"/>
           </a:p>
           <a:p>
             <a:pPr lvl="2"/>
@@ -1557,7 +1551,6 @@
               <a:rPr lang="en-US" smtClean="0"/>
               <a:t>Third level</a:t>
             </a:r>
-            <a:endParaRPr lang="en-US" smtClean="0"/>
           </a:p>
           <a:p>
             <a:pPr lvl="3"/>
@@ -1565,7 +1558,6 @@
               <a:rPr lang="en-US" smtClean="0"/>
               <a:t>Fourth level</a:t>
             </a:r>
-            <a:endParaRPr lang="en-US" smtClean="0"/>
           </a:p>
           <a:p>
             <a:pPr lvl="4"/>
@@ -1594,6 +1586,7 @@
           <a:p>
             <a:fld id="{63A1C593-65D0-4073-BCC9-577B9352EA97}" type="datetimeFigureOut">
               <a:rPr lang="en-US" smtClean="0"/>
+              <a:t>4/29/2021</a:t>
             </a:fld>
             <a:endParaRPr lang="en-US"/>
           </a:p>
@@ -1635,6 +1628,7 @@
           <a:p>
             <a:fld id="{9B618960-8005-486C-9A75-10CB2AAC16F9}" type="slidenum">
               <a:rPr lang="en-US" smtClean="0"/>
+              <a:t>‹#›</a:t>
             </a:fld>
             <a:endParaRPr lang="en-US"/>
           </a:p>
@@ -1705,6 +1699,7 @@
           <a:p>
             <a:fld id="{63A1C593-65D0-4073-BCC9-577B9352EA97}" type="datetimeFigureOut">
               <a:rPr lang="en-US" smtClean="0"/>
+              <a:t>4/29/2021</a:t>
             </a:fld>
             <a:endParaRPr lang="en-US"/>
           </a:p>
@@ -1746,6 +1741,7 @@
           <a:p>
             <a:fld id="{9B618960-8005-486C-9A75-10CB2AAC16F9}" type="slidenum">
               <a:rPr lang="en-US" smtClean="0"/>
+              <a:t>‹#›</a:t>
             </a:fld>
             <a:endParaRPr lang="en-US"/>
           </a:p>
@@ -1793,6 +1789,7 @@
           <a:p>
             <a:fld id="{63A1C593-65D0-4073-BCC9-577B9352EA97}" type="datetimeFigureOut">
               <a:rPr lang="en-US" smtClean="0"/>
+              <a:t>4/29/2021</a:t>
             </a:fld>
             <a:endParaRPr lang="en-US"/>
           </a:p>
@@ -1834,6 +1831,7 @@
           <a:p>
             <a:fld id="{9B618960-8005-486C-9A75-10CB2AAC16F9}" type="slidenum">
               <a:rPr lang="en-US" smtClean="0"/>
+              <a:t>‹#›</a:t>
             </a:fld>
             <a:endParaRPr lang="en-US"/>
           </a:p>
@@ -1949,7 +1947,6 @@
               <a:rPr lang="en-US" smtClean="0"/>
               <a:t>Click to edit Master text styles</a:t>
             </a:r>
-            <a:endParaRPr lang="en-US" smtClean="0"/>
           </a:p>
           <a:p>
             <a:pPr lvl="1"/>
@@ -1957,7 +1954,6 @@
               <a:rPr lang="en-US" smtClean="0"/>
               <a:t>Second level</a:t>
             </a:r>
-            <a:endParaRPr lang="en-US" smtClean="0"/>
           </a:p>
           <a:p>
             <a:pPr lvl="2"/>
@@ -1965,7 +1961,6 @@
               <a:rPr lang="en-US" smtClean="0"/>
               <a:t>Third level</a:t>
             </a:r>
-            <a:endParaRPr lang="en-US" smtClean="0"/>
           </a:p>
           <a:p>
             <a:pPr lvl="3"/>
@@ -1973,7 +1968,6 @@
               <a:rPr lang="en-US" smtClean="0"/>
               <a:t>Fourth level</a:t>
             </a:r>
-            <a:endParaRPr lang="en-US" smtClean="0"/>
           </a:p>
           <a:p>
             <a:pPr lvl="4"/>
@@ -2047,7 +2041,6 @@
               <a:rPr lang="en-US" smtClean="0"/>
               <a:t>Click to edit Master text styles</a:t>
             </a:r>
-            <a:endParaRPr lang="en-US" smtClean="0"/>
           </a:p>
         </p:txBody>
       </p:sp>
@@ -2068,6 +2061,7 @@
           <a:p>
             <a:fld id="{63A1C593-65D0-4073-BCC9-577B9352EA97}" type="datetimeFigureOut">
               <a:rPr lang="en-US" smtClean="0"/>
+              <a:t>4/29/2021</a:t>
             </a:fld>
             <a:endParaRPr lang="en-US"/>
           </a:p>
@@ -2109,6 +2103,7 @@
           <a:p>
             <a:fld id="{9B618960-8005-486C-9A75-10CB2AAC16F9}" type="slidenum">
               <a:rPr lang="en-US" smtClean="0"/>
+              <a:t>‹#›</a:t>
             </a:fld>
             <a:endParaRPr lang="en-US"/>
           </a:p>
@@ -2294,7 +2289,6 @@
               <a:rPr lang="en-US" smtClean="0"/>
               <a:t>Click to edit Master text styles</a:t>
             </a:r>
-            <a:endParaRPr lang="en-US" smtClean="0"/>
           </a:p>
         </p:txBody>
       </p:sp>
@@ -2315,6 +2309,7 @@
           <a:p>
             <a:fld id="{63A1C593-65D0-4073-BCC9-577B9352EA97}" type="datetimeFigureOut">
               <a:rPr lang="en-US" smtClean="0"/>
+              <a:t>4/29/2021</a:t>
             </a:fld>
             <a:endParaRPr lang="en-US"/>
           </a:p>
@@ -2356,6 +2351,7 @@
           <a:p>
             <a:fld id="{9B618960-8005-486C-9A75-10CB2AAC16F9}" type="slidenum">
               <a:rPr lang="en-US" smtClean="0"/>
+              <a:t>‹#›</a:t>
             </a:fld>
             <a:endParaRPr lang="en-US"/>
           </a:p>
@@ -2454,7 +2450,6 @@
               <a:rPr lang="en-US" smtClean="0"/>
               <a:t>Click to edit Master text styles</a:t>
             </a:r>
-            <a:endParaRPr lang="en-US" smtClean="0"/>
           </a:p>
           <a:p>
             <a:pPr lvl="1"/>
@@ -2462,7 +2457,6 @@
               <a:rPr lang="en-US" smtClean="0"/>
               <a:t>Second level</a:t>
             </a:r>
-            <a:endParaRPr lang="en-US" smtClean="0"/>
           </a:p>
           <a:p>
             <a:pPr lvl="2"/>
@@ -2470,7 +2464,6 @@
               <a:rPr lang="en-US" smtClean="0"/>
               <a:t>Third level</a:t>
             </a:r>
-            <a:endParaRPr lang="en-US" smtClean="0"/>
           </a:p>
           <a:p>
             <a:pPr lvl="3"/>
@@ -2478,7 +2471,6 @@
               <a:rPr lang="en-US" smtClean="0"/>
               <a:t>Fourth level</a:t>
             </a:r>
-            <a:endParaRPr lang="en-US" smtClean="0"/>
           </a:p>
           <a:p>
             <a:pPr lvl="4"/>
@@ -2525,6 +2517,7 @@
           <a:p>
             <a:fld id="{63A1C593-65D0-4073-BCC9-577B9352EA97}" type="datetimeFigureOut">
               <a:rPr lang="en-US" smtClean="0"/>
+              <a:t>4/29/2021</a:t>
             </a:fld>
             <a:endParaRPr lang="en-US"/>
           </a:p>
@@ -2602,6 +2595,7 @@
           <a:p>
             <a:fld id="{9B618960-8005-486C-9A75-10CB2AAC16F9}" type="slidenum">
               <a:rPr lang="en-US" smtClean="0"/>
+              <a:t>‹#›</a:t>
             </a:fld>
             <a:endParaRPr lang="en-US"/>
           </a:p>
@@ -2915,7 +2909,14 @@
         <p:cNvGrpSpPr/>
         <p:nvPr/>
       </p:nvGrpSpPr>
-      <p:grpSpPr/>
+      <p:grpSpPr>
+        <a:xfrm>
+          <a:off x="0" y="0"/>
+          <a:ext cx="0" cy="0"/>
+          <a:chOff x="0" y="0"/>
+          <a:chExt cx="0" cy="0"/>
+        </a:xfrm>
+      </p:grpSpPr>
       <p:sp>
         <p:nvSpPr>
           <p:cNvPr id="4" name="Title 3"/>
@@ -2937,6 +2938,7 @@
         </p:spPr>
         <p:txBody>
           <a:bodyPr/>
+          <a:lstStyle/>
           <a:p>
             <a:r>
               <a:rPr lang="en-US">
@@ -2969,34 +2971,6 @@
               </a:rPr>
               <a:t>ALGORITHM FOR STUDENTS</a:t>
             </a:r>
-            <a:endParaRPr lang="en-US">
-              <a:ln w="12700">
-                <a:solidFill>
-                  <a:schemeClr val="tx2">
-                    <a:lumMod val="75000"/>
-                  </a:schemeClr>
-                </a:solidFill>
-                <a:prstDash val="solid"/>
-              </a:ln>
-              <a:pattFill prst="dkUpDiag">
-                <a:fgClr>
-                  <a:schemeClr val="tx2"/>
-                </a:fgClr>
-                <a:bgClr>
-                  <a:schemeClr val="tx2">
-                    <a:lumMod val="20000"/>
-                    <a:lumOff val="80000"/>
-                  </a:schemeClr>
-                </a:bgClr>
-              </a:pattFill>
-              <a:effectLst>
-                <a:outerShdw dist="38100" dir="2640000" algn="bl" rotWithShape="0">
-                  <a:schemeClr val="tx2">
-                    <a:lumMod val="75000"/>
-                  </a:schemeClr>
-                </a:outerShdw>
-              </a:effectLst>
-            </a:endParaRPr>
           </a:p>
         </p:txBody>
       </p:sp>
@@ -3077,103 +3051,94 @@
         </p:spPr>
         <p:txBody>
           <a:bodyPr/>
-          <a:p>
-            <a:r>
-              <a:rPr lang="en-US">
+          <a:lstStyle/>
+          <a:p>
+            <a:r>
+              <a:rPr lang="en-US" dirty="0">
                 <a:latin typeface="Times New Roman" panose="02020603050405020304" charset="0"/>
                 <a:cs typeface="Times New Roman" panose="02020603050405020304" charset="0"/>
               </a:rPr>
               <a:t>Step1: START</a:t>
             </a:r>
-            <a:endParaRPr lang="en-US">
-              <a:latin typeface="Times New Roman" panose="02020603050405020304" charset="0"/>
-              <a:cs typeface="Times New Roman" panose="02020603050405020304" charset="0"/>
-            </a:endParaRPr>
-          </a:p>
-          <a:p>
-            <a:r>
-              <a:rPr lang="en-US">
+          </a:p>
+          <a:p>
+            <a:r>
+              <a:rPr lang="en-US" dirty="0">
                 <a:latin typeface="Times New Roman" panose="02020603050405020304" charset="0"/>
                 <a:cs typeface="Times New Roman" panose="02020603050405020304" charset="0"/>
                 <a:sym typeface="+mn-ea"/>
               </a:rPr>
               <a:t>Step 2: Import pandas</a:t>
             </a:r>
-            <a:endParaRPr lang="en-US">
+            <a:endParaRPr lang="en-US" dirty="0">
               <a:latin typeface="Times New Roman" panose="02020603050405020304" charset="0"/>
               <a:cs typeface="Times New Roman" panose="02020603050405020304" charset="0"/>
             </a:endParaRPr>
           </a:p>
           <a:p>
             <a:r>
-              <a:rPr lang="en-US">
+              <a:rPr lang="en-US" dirty="0">
                 <a:latin typeface="Times New Roman" panose="02020603050405020304" charset="0"/>
                 <a:cs typeface="Times New Roman" panose="02020603050405020304" charset="0"/>
               </a:rPr>
               <a:t>Step 3: Assign variables to Names, Age, Height, Scores, Gender</a:t>
             </a:r>
-            <a:endParaRPr lang="en-US">
-              <a:latin typeface="Times New Roman" panose="02020603050405020304" charset="0"/>
-              <a:cs typeface="Times New Roman" panose="02020603050405020304" charset="0"/>
-            </a:endParaRPr>
-          </a:p>
-          <a:p>
-            <a:r>
-              <a:rPr lang="en-US">
+          </a:p>
+          <a:p>
+            <a:r>
+              <a:rPr lang="en-US" dirty="0">
                 <a:latin typeface="Times New Roman" panose="02020603050405020304" charset="0"/>
                 <a:cs typeface="Times New Roman" panose="02020603050405020304" charset="0"/>
               </a:rPr>
               <a:t>Step 4: Create a dictionary, tab, for the variables assigned</a:t>
             </a:r>
-            <a:endParaRPr lang="en-US">
-              <a:latin typeface="Times New Roman" panose="02020603050405020304" charset="0"/>
-              <a:cs typeface="Times New Roman" panose="02020603050405020304" charset="0"/>
-            </a:endParaRPr>
-          </a:p>
-          <a:p>
-            <a:r>
-              <a:rPr lang="en-US">
+          </a:p>
+          <a:p>
+            <a:r>
+              <a:rPr lang="en-US" dirty="0">
                 <a:latin typeface="Times New Roman" panose="02020603050405020304" charset="0"/>
                 <a:cs typeface="Times New Roman" panose="02020603050405020304" charset="0"/>
               </a:rPr>
-              <a:t>Step 5: Convert tab to dataframe using pandas</a:t>
-            </a:r>
-            <a:endParaRPr lang="en-US">
-              <a:latin typeface="Times New Roman" panose="02020603050405020304" charset="0"/>
-              <a:cs typeface="Times New Roman" panose="02020603050405020304" charset="0"/>
-            </a:endParaRPr>
-          </a:p>
-          <a:p>
-            <a:r>
-              <a:rPr lang="en-US">
+              <a:t>Step 5: Convert tab to </a:t>
+            </a:r>
+            <a:r>
+              <a:rPr lang="en-US" dirty="0" err="1">
+                <a:latin typeface="Times New Roman" panose="02020603050405020304" charset="0"/>
+                <a:cs typeface="Times New Roman" panose="02020603050405020304" charset="0"/>
+              </a:rPr>
+              <a:t>dataframe</a:t>
+            </a:r>
+            <a:r>
+              <a:rPr lang="en-US" dirty="0">
+                <a:latin typeface="Times New Roman" panose="02020603050405020304" charset="0"/>
+                <a:cs typeface="Times New Roman" panose="02020603050405020304" charset="0"/>
+              </a:rPr>
+              <a:t> using pandas</a:t>
+            </a:r>
+          </a:p>
+          <a:p>
+            <a:r>
+              <a:rPr lang="en-US" dirty="0">
                 <a:latin typeface="Times New Roman" panose="02020603050405020304" charset="0"/>
                 <a:cs typeface="Times New Roman" panose="02020603050405020304" charset="0"/>
               </a:rPr>
               <a:t>Step 6: View data</a:t>
             </a:r>
-            <a:endParaRPr lang="en-US">
-              <a:latin typeface="Times New Roman" panose="02020603050405020304" charset="0"/>
-              <a:cs typeface="Times New Roman" panose="02020603050405020304" charset="0"/>
-            </a:endParaRPr>
-          </a:p>
-          <a:p>
-            <a:r>
-              <a:rPr lang="en-US">
+          </a:p>
+          <a:p>
+            <a:r>
+              <a:rPr lang="en-US" dirty="0">
                 <a:latin typeface="Times New Roman" panose="02020603050405020304" charset="0"/>
                 <a:cs typeface="Times New Roman" panose="02020603050405020304" charset="0"/>
               </a:rPr>
               <a:t>Step 7: Save data in working directory</a:t>
             </a:r>
-            <a:endParaRPr lang="en-US">
-              <a:latin typeface="Times New Roman" panose="02020603050405020304" charset="0"/>
-              <a:cs typeface="Times New Roman" panose="02020603050405020304" charset="0"/>
-            </a:endParaRPr>
           </a:p>
           <a:p>
             <a:pPr marL="0" indent="0">
               <a:buNone/>
             </a:pPr>
-            <a:endParaRPr lang="en-US">
+            <a:endParaRPr lang="en-US" dirty="0">
               <a:latin typeface="Times New Roman" panose="02020603050405020304" charset="0"/>
               <a:cs typeface="Times New Roman" panose="02020603050405020304" charset="0"/>
             </a:endParaRPr>
@@ -3231,7 +3196,14 @@
         <p:cNvGrpSpPr/>
         <p:nvPr/>
       </p:nvGrpSpPr>
-      <p:grpSpPr/>
+      <p:grpSpPr>
+        <a:xfrm>
+          <a:off x="0" y="0"/>
+          <a:ext cx="0" cy="0"/>
+          <a:chOff x="0" y="0"/>
+          <a:chExt cx="0" cy="0"/>
+        </a:xfrm>
+      </p:grpSpPr>
       <p:sp>
         <p:nvSpPr>
           <p:cNvPr id="4" name="Flowchart: Terminator 3"/>
@@ -3282,13 +3254,13 @@
         </p:style>
         <p:txBody>
           <a:bodyPr rtlCol="0" anchor="ctr"/>
+          <a:lstStyle/>
           <a:p>
             <a:pPr algn="ctr"/>
             <a:r>
               <a:rPr lang="en-US"/>
               <a:t>START</a:t>
             </a:r>
-            <a:endParaRPr lang="en-US"/>
           </a:p>
         </p:txBody>
       </p:sp>
@@ -3492,13 +3464,13 @@
         </p:style>
         <p:txBody>
           <a:bodyPr rtlCol="0" anchor="ctr"/>
+          <a:lstStyle/>
           <a:p>
             <a:pPr algn="ctr"/>
             <a:r>
               <a:rPr lang="en-US"/>
               <a:t>Import pandas</a:t>
             </a:r>
-            <a:endParaRPr lang="en-US"/>
           </a:p>
         </p:txBody>
       </p:sp>
@@ -3552,13 +3524,13 @@
         </p:style>
         <p:txBody>
           <a:bodyPr rtlCol="0" anchor="ctr"/>
+          <a:lstStyle/>
           <a:p>
             <a:pPr algn="ctr"/>
             <a:r>
               <a:rPr lang="en-US"/>
               <a:t>Assign variables to Names, Age, Height, Score, Gender</a:t>
             </a:r>
-            <a:endParaRPr lang="en-US"/>
           </a:p>
         </p:txBody>
       </p:sp>
@@ -3649,6 +3621,7 @@
         </p:style>
         <p:txBody>
           <a:bodyPr rtlCol="0" anchor="ctr"/>
+          <a:lstStyle/>
           <a:p>
             <a:pPr algn="ctr"/>
             <a:r>
@@ -3748,6 +3721,7 @@
         </p:style>
         <p:txBody>
           <a:bodyPr rtlCol="0" anchor="ctr"/>
+          <a:lstStyle/>
           <a:p>
             <a:pPr algn="ctr"/>
             <a:r>
@@ -3847,6 +3821,7 @@
         </p:style>
         <p:txBody>
           <a:bodyPr rtlCol="0" anchor="ctr"/>
+          <a:lstStyle/>
           <a:p>
             <a:pPr algn="ctr"/>
             <a:r>
@@ -3909,13 +3884,13 @@
         </p:style>
         <p:txBody>
           <a:bodyPr rtlCol="0" anchor="ctr"/>
+          <a:lstStyle/>
           <a:p>
             <a:pPr algn="ctr"/>
             <a:r>
               <a:rPr lang="en-US"/>
               <a:t>View data </a:t>
             </a:r>
-            <a:endParaRPr lang="en-US"/>
           </a:p>
         </p:txBody>
       </p:sp>
@@ -3969,17 +3944,3094 @@
         </p:style>
         <p:txBody>
           <a:bodyPr rtlCol="0" anchor="ctr"/>
+          <a:lstStyle/>
           <a:p>
             <a:pPr algn="ctr"/>
             <a:r>
               <a:rPr lang="en-US"/>
               <a:t>END</a:t>
             </a:r>
+          </a:p>
+        </p:txBody>
+      </p:sp>
+    </p:spTree>
+  </p:cSld>
+  <p:clrMapOvr>
+    <a:masterClrMapping/>
+  </p:clrMapOvr>
+</p:sld>
+</file>
+
+<file path=ppt/slides/slide4.xml><?xml version="1.0" encoding="utf-8"?>
+<p:sld xmlns:a="http://schemas.openxmlformats.org/drawingml/2006/main" xmlns:r="http://schemas.openxmlformats.org/officeDocument/2006/relationships" xmlns:p="http://schemas.openxmlformats.org/presentationml/2006/main">
+  <p:cSld>
+    <p:spTree>
+      <p:nvGrpSpPr>
+        <p:cNvPr id="1" name=""/>
+        <p:cNvGrpSpPr/>
+        <p:nvPr/>
+      </p:nvGrpSpPr>
+      <p:grpSpPr>
+        <a:xfrm>
+          <a:off x="0" y="0"/>
+          <a:ext cx="0" cy="0"/>
+          <a:chOff x="0" y="0"/>
+          <a:chExt cx="0" cy="0"/>
+        </a:xfrm>
+      </p:grpSpPr>
+      <p:sp>
+        <p:nvSpPr>
+          <p:cNvPr id="3" name="Content Placeholder 2"/>
+          <p:cNvSpPr>
+            <a:spLocks noGrp="1"/>
+          </p:cNvSpPr>
+          <p:nvPr>
+            <p:ph idx="1"/>
+          </p:nvPr>
+        </p:nvSpPr>
+        <p:spPr>
+          <a:xfrm>
+            <a:off x="838200" y="576197"/>
+            <a:ext cx="10515600" cy="5600766"/>
+          </a:xfrm>
+        </p:spPr>
+        <p:txBody>
+          <a:bodyPr>
+            <a:normAutofit/>
+          </a:bodyPr>
+          <a:lstStyle/>
+          <a:p>
+            <a:r>
+              <a:rPr lang="en-US" dirty="0">
+                <a:latin typeface="Times New Roman" panose="02020603050405020304" charset="0"/>
+                <a:cs typeface="Times New Roman" panose="02020603050405020304" charset="0"/>
+              </a:rPr>
+              <a:t>Step1: START</a:t>
+            </a:r>
+          </a:p>
+          <a:p>
+            <a:r>
+              <a:rPr lang="en-GB" dirty="0" smtClean="0">
+                <a:latin typeface="Times New Roman" panose="02020603050405020304" charset="0"/>
+                <a:cs typeface="Times New Roman" panose="02020603050405020304" charset="0"/>
+                <a:sym typeface="+mn-ea"/>
+              </a:rPr>
+              <a:t>Step 2: INPUT declare either even or odds for each player</a:t>
+            </a:r>
+            <a:endParaRPr lang="en-US" dirty="0" smtClean="0">
+              <a:latin typeface="Times New Roman" panose="02020603050405020304" charset="0"/>
+              <a:cs typeface="Times New Roman" panose="02020603050405020304" charset="0"/>
+              <a:sym typeface="+mn-ea"/>
+            </a:endParaRPr>
+          </a:p>
+          <a:p>
+            <a:r>
+              <a:rPr lang="en-US" dirty="0" smtClean="0">
+                <a:latin typeface="Times New Roman" panose="02020603050405020304" charset="0"/>
+                <a:cs typeface="Times New Roman" panose="02020603050405020304" charset="0"/>
+                <a:sym typeface="+mn-ea"/>
+              </a:rPr>
+              <a:t>Step 3: INPUT number of of player 1, a</a:t>
+            </a:r>
+          </a:p>
+          <a:p>
+            <a:r>
+              <a:rPr lang="en-US" dirty="0">
+                <a:latin typeface="Times New Roman" panose="02020603050405020304" charset="0"/>
+                <a:cs typeface="Times New Roman" panose="02020603050405020304" charset="0"/>
+                <a:sym typeface="+mn-ea"/>
+              </a:rPr>
+              <a:t>Step 4</a:t>
+            </a:r>
+            <a:r>
+              <a:rPr lang="en-US" dirty="0" smtClean="0">
+                <a:latin typeface="Times New Roman" panose="02020603050405020304" charset="0"/>
+                <a:cs typeface="Times New Roman" panose="02020603050405020304" charset="0"/>
+                <a:sym typeface="+mn-ea"/>
+              </a:rPr>
+              <a:t>: </a:t>
+            </a:r>
+            <a:r>
+              <a:rPr lang="en-US" dirty="0">
+                <a:latin typeface="Times New Roman" panose="02020603050405020304" charset="0"/>
+                <a:cs typeface="Times New Roman" panose="02020603050405020304" charset="0"/>
+                <a:sym typeface="+mn-ea"/>
+              </a:rPr>
+              <a:t>INPUT number of player </a:t>
+            </a:r>
+            <a:r>
+              <a:rPr lang="en-US" dirty="0" smtClean="0">
+                <a:latin typeface="Times New Roman" panose="02020603050405020304" charset="0"/>
+                <a:cs typeface="Times New Roman" panose="02020603050405020304" charset="0"/>
+                <a:sym typeface="+mn-ea"/>
+              </a:rPr>
+              <a:t>2, b</a:t>
+            </a:r>
+            <a:endParaRPr lang="en-US" dirty="0">
+              <a:latin typeface="Times New Roman" panose="02020603050405020304" charset="0"/>
+              <a:cs typeface="Times New Roman" panose="02020603050405020304" charset="0"/>
+            </a:endParaRPr>
+          </a:p>
+          <a:p>
+            <a:r>
+              <a:rPr lang="en-US" dirty="0">
+                <a:latin typeface="Times New Roman" panose="02020603050405020304" charset="0"/>
+                <a:cs typeface="Times New Roman" panose="02020603050405020304" charset="0"/>
+              </a:rPr>
+              <a:t>Step </a:t>
+            </a:r>
+            <a:r>
+              <a:rPr lang="en-US" dirty="0" smtClean="0">
+                <a:latin typeface="Times New Roman" panose="02020603050405020304" charset="0"/>
+                <a:cs typeface="Times New Roman" panose="02020603050405020304" charset="0"/>
+              </a:rPr>
+              <a:t>5: COMPUTE c = a + b</a:t>
+            </a:r>
+          </a:p>
+          <a:p>
+            <a:r>
+              <a:rPr lang="en-GB" dirty="0" smtClean="0">
+                <a:latin typeface="Times New Roman" panose="02020603050405020304" charset="0"/>
+                <a:cs typeface="Times New Roman" panose="02020603050405020304" charset="0"/>
+              </a:rPr>
+              <a:t>Step 6: </a:t>
+            </a:r>
+            <a:r>
+              <a:rPr lang="en-US" dirty="0">
+                <a:latin typeface="Times New Roman" panose="02020603050405020304" charset="0"/>
+                <a:cs typeface="Times New Roman" panose="02020603050405020304" charset="0"/>
+              </a:rPr>
+              <a:t>COMPUTE c</a:t>
+            </a:r>
+            <a:r>
+              <a:rPr lang="en-US" dirty="0" smtClean="0">
+                <a:latin typeface="Times New Roman" panose="02020603050405020304" charset="0"/>
+                <a:cs typeface="Times New Roman" panose="02020603050405020304" charset="0"/>
+              </a:rPr>
+              <a:t> </a:t>
+            </a:r>
+            <a:r>
+              <a:rPr lang="en-US" dirty="0">
+                <a:latin typeface="Times New Roman" panose="02020603050405020304" charset="0"/>
+                <a:cs typeface="Times New Roman" panose="02020603050405020304" charset="0"/>
+              </a:rPr>
+              <a:t>divided by </a:t>
+            </a:r>
+            <a:r>
+              <a:rPr lang="en-US" dirty="0" smtClean="0">
+                <a:latin typeface="Times New Roman" panose="02020603050405020304" charset="0"/>
+                <a:cs typeface="Times New Roman" panose="02020603050405020304" charset="0"/>
+              </a:rPr>
+              <a:t>2</a:t>
+            </a:r>
+          </a:p>
+          <a:p>
+            <a:r>
+              <a:rPr lang="en-US" dirty="0" smtClean="0">
+                <a:latin typeface="Times New Roman" panose="02020603050405020304" charset="0"/>
+                <a:cs typeface="Times New Roman" panose="02020603050405020304" charset="0"/>
+              </a:rPr>
+              <a:t>Step 6: IF remainder == 0 THEN</a:t>
+            </a:r>
+          </a:p>
+          <a:p>
+            <a:pPr marL="457200" lvl="1" indent="0">
+              <a:buNone/>
+            </a:pPr>
+            <a:r>
+              <a:rPr lang="en-GB" dirty="0" smtClean="0">
+                <a:latin typeface="Times New Roman" panose="02020603050405020304" charset="0"/>
+                <a:cs typeface="Times New Roman" panose="02020603050405020304" charset="0"/>
+              </a:rPr>
+              <a:t>		PRINT player that declared even wins</a:t>
+            </a:r>
+          </a:p>
+          <a:p>
+            <a:pPr marL="457200" lvl="1" indent="0">
+              <a:buNone/>
+            </a:pPr>
+            <a:r>
+              <a:rPr lang="en-GB" dirty="0" smtClean="0">
+                <a:latin typeface="Times New Roman" panose="02020603050405020304" charset="0"/>
+                <a:cs typeface="Times New Roman" panose="02020603050405020304" charset="0"/>
+              </a:rPr>
+              <a:t>	      ELSE </a:t>
+            </a:r>
+          </a:p>
+          <a:p>
+            <a:pPr marL="457200" lvl="1" indent="0">
+              <a:buNone/>
+            </a:pPr>
+            <a:r>
+              <a:rPr lang="en-GB" dirty="0">
+                <a:latin typeface="Times New Roman" panose="02020603050405020304" charset="0"/>
+                <a:cs typeface="Times New Roman" panose="02020603050405020304" charset="0"/>
+              </a:rPr>
+              <a:t>	</a:t>
+            </a:r>
+            <a:r>
+              <a:rPr lang="en-GB" dirty="0" smtClean="0">
+                <a:latin typeface="Times New Roman" panose="02020603050405020304" charset="0"/>
+                <a:cs typeface="Times New Roman" panose="02020603050405020304" charset="0"/>
+              </a:rPr>
+              <a:t>	PRINT player that declared odd wins</a:t>
+            </a:r>
+          </a:p>
+          <a:p>
+            <a:pPr marL="457200" lvl="1" indent="0">
+              <a:buNone/>
+            </a:pPr>
+            <a:r>
+              <a:rPr lang="en-GB" dirty="0">
+                <a:latin typeface="Times New Roman" panose="02020603050405020304" charset="0"/>
+                <a:cs typeface="Times New Roman" panose="02020603050405020304" charset="0"/>
+              </a:rPr>
+              <a:t> </a:t>
+            </a:r>
+            <a:r>
+              <a:rPr lang="en-GB" dirty="0" smtClean="0">
+                <a:latin typeface="Times New Roman" panose="02020603050405020304" charset="0"/>
+                <a:cs typeface="Times New Roman" panose="02020603050405020304" charset="0"/>
+              </a:rPr>
+              <a:t>           ENDIF</a:t>
+            </a:r>
+            <a:endParaRPr lang="en-US" dirty="0">
+              <a:latin typeface="Times New Roman" panose="02020603050405020304" charset="0"/>
+              <a:cs typeface="Times New Roman" panose="02020603050405020304" charset="0"/>
+            </a:endParaRPr>
+          </a:p>
+          <a:p>
+            <a:endParaRPr lang="en-US" dirty="0"/>
+          </a:p>
+        </p:txBody>
+      </p:sp>
+    </p:spTree>
+    <p:extLst>
+      <p:ext uri="{BB962C8B-B14F-4D97-AF65-F5344CB8AC3E}">
+        <p14:creationId xmlns:p14="http://schemas.microsoft.com/office/powerpoint/2010/main" val="1793280011"/>
+      </p:ext>
+    </p:extLst>
+  </p:cSld>
+  <p:clrMapOvr>
+    <a:masterClrMapping/>
+  </p:clrMapOvr>
+</p:sld>
+</file>
+
+<file path=ppt/slides/slide5.xml><?xml version="1.0" encoding="utf-8"?>
+<p:sld xmlns:a="http://schemas.openxmlformats.org/drawingml/2006/main" xmlns:r="http://schemas.openxmlformats.org/officeDocument/2006/relationships" xmlns:p="http://schemas.openxmlformats.org/presentationml/2006/main">
+  <p:cSld>
+    <p:spTree>
+      <p:nvGrpSpPr>
+        <p:cNvPr id="1" name=""/>
+        <p:cNvGrpSpPr/>
+        <p:nvPr/>
+      </p:nvGrpSpPr>
+      <p:grpSpPr>
+        <a:xfrm>
+          <a:off x="0" y="0"/>
+          <a:ext cx="0" cy="0"/>
+          <a:chOff x="0" y="0"/>
+          <a:chExt cx="0" cy="0"/>
+        </a:xfrm>
+      </p:grpSpPr>
+      <p:sp>
+        <p:nvSpPr>
+          <p:cNvPr id="2" name="Flowchart: Terminator 1"/>
+          <p:cNvSpPr/>
+          <p:nvPr/>
+        </p:nvSpPr>
+        <p:spPr>
+          <a:xfrm>
+            <a:off x="4407533" y="9842"/>
+            <a:ext cx="2329815" cy="422275"/>
+          </a:xfrm>
+          <a:prstGeom prst="flowChartTerminator">
+            <a:avLst/>
+          </a:prstGeom>
+          <a:gradFill>
+            <a:gsLst>
+              <a:gs pos="0">
+                <a:srgbClr val="E30000"/>
+              </a:gs>
+              <a:gs pos="100000">
+                <a:srgbClr val="760303"/>
+              </a:gs>
+            </a:gsLst>
+            <a:lin ang="5400000" scaled="0"/>
+          </a:gradFill>
+          <a:ln w="12700" cmpd="sng">
+            <a:solidFill>
+              <a:schemeClr val="tx1"/>
+            </a:solidFill>
+            <a:prstDash val="solid"/>
+          </a:ln>
+        </p:spPr>
+        <p:style>
+          <a:lnRef idx="2">
+            <a:schemeClr val="accent1">
+              <a:shade val="50000"/>
+            </a:schemeClr>
+          </a:lnRef>
+          <a:fillRef idx="1">
+            <a:schemeClr val="accent1"/>
+          </a:fillRef>
+          <a:effectRef idx="0">
+            <a:schemeClr val="accent1"/>
+          </a:effectRef>
+          <a:fontRef idx="minor">
+            <a:schemeClr val="lt1"/>
+          </a:fontRef>
+        </p:style>
+        <p:txBody>
+          <a:bodyPr rtlCol="0" anchor="ctr"/>
+          <a:lstStyle/>
+          <a:p>
+            <a:pPr algn="ctr"/>
+            <a:r>
+              <a:rPr lang="en-US"/>
+              <a:t>START</a:t>
+            </a:r>
+          </a:p>
+        </p:txBody>
+      </p:sp>
+      <p:cxnSp>
+        <p:nvCxnSpPr>
+          <p:cNvPr id="3" name="Straight Arrow Connector 2"/>
+          <p:cNvCxnSpPr/>
+          <p:nvPr/>
+        </p:nvCxnSpPr>
+        <p:spPr>
+          <a:xfrm flipH="1">
+            <a:off x="5567360" y="449079"/>
+            <a:ext cx="5080" cy="300990"/>
+          </a:xfrm>
+          <a:prstGeom prst="straightConnector1">
+            <a:avLst/>
+          </a:prstGeom>
+          <a:ln w="12700" cmpd="sng">
+            <a:solidFill>
+              <a:schemeClr val="tx1"/>
+            </a:solidFill>
+            <a:prstDash val="solid"/>
+            <a:tailEnd type="arrow"/>
+          </a:ln>
+        </p:spPr>
+        <p:style>
+          <a:lnRef idx="1">
+            <a:schemeClr val="accent1"/>
+          </a:lnRef>
+          <a:fillRef idx="0">
+            <a:schemeClr val="accent1"/>
+          </a:fillRef>
+          <a:effectRef idx="0">
+            <a:schemeClr val="accent1"/>
+          </a:effectRef>
+          <a:fontRef idx="minor">
+            <a:schemeClr val="tx1"/>
+          </a:fontRef>
+        </p:style>
+      </p:cxnSp>
+      <p:cxnSp>
+        <p:nvCxnSpPr>
+          <p:cNvPr id="4" name="Straight Arrow Connector 3"/>
+          <p:cNvCxnSpPr/>
+          <p:nvPr/>
+        </p:nvCxnSpPr>
+        <p:spPr>
+          <a:xfrm>
+            <a:off x="5598795" y="1284404"/>
+            <a:ext cx="4445" cy="224790"/>
+          </a:xfrm>
+          <a:prstGeom prst="straightConnector1">
+            <a:avLst/>
+          </a:prstGeom>
+          <a:ln w="12700" cmpd="sng">
+            <a:solidFill>
+              <a:schemeClr val="tx1"/>
+            </a:solidFill>
+            <a:prstDash val="solid"/>
+            <a:tailEnd type="arrow"/>
+          </a:ln>
+        </p:spPr>
+        <p:style>
+          <a:lnRef idx="1">
+            <a:schemeClr val="accent1"/>
+          </a:lnRef>
+          <a:fillRef idx="0">
+            <a:schemeClr val="accent1"/>
+          </a:fillRef>
+          <a:effectRef idx="0">
+            <a:schemeClr val="accent1"/>
+          </a:effectRef>
+          <a:fontRef idx="minor">
+            <a:schemeClr val="tx1"/>
+          </a:fontRef>
+        </p:style>
+      </p:cxnSp>
+      <p:cxnSp>
+        <p:nvCxnSpPr>
+          <p:cNvPr id="5" name="Straight Arrow Connector 4"/>
+          <p:cNvCxnSpPr/>
+          <p:nvPr/>
+        </p:nvCxnSpPr>
+        <p:spPr>
+          <a:xfrm>
+            <a:off x="5605780" y="2130124"/>
+            <a:ext cx="8255" cy="260150"/>
+          </a:xfrm>
+          <a:prstGeom prst="straightConnector1">
+            <a:avLst/>
+          </a:prstGeom>
+          <a:ln w="12700" cmpd="sng">
+            <a:solidFill>
+              <a:schemeClr val="tx1"/>
+            </a:solidFill>
+            <a:prstDash val="solid"/>
+            <a:tailEnd type="arrow"/>
+          </a:ln>
+        </p:spPr>
+        <p:style>
+          <a:lnRef idx="1">
+            <a:schemeClr val="accent1"/>
+          </a:lnRef>
+          <a:fillRef idx="0">
+            <a:schemeClr val="accent1"/>
+          </a:fillRef>
+          <a:effectRef idx="0">
+            <a:schemeClr val="accent1"/>
+          </a:effectRef>
+          <a:fontRef idx="minor">
+            <a:schemeClr val="tx1"/>
+          </a:fontRef>
+        </p:style>
+      </p:cxnSp>
+      <p:cxnSp>
+        <p:nvCxnSpPr>
+          <p:cNvPr id="6" name="Straight Arrow Connector 5"/>
+          <p:cNvCxnSpPr/>
+          <p:nvPr/>
+        </p:nvCxnSpPr>
+        <p:spPr>
+          <a:xfrm flipH="1">
+            <a:off x="5558503" y="3734267"/>
+            <a:ext cx="8255" cy="269240"/>
+          </a:xfrm>
+          <a:prstGeom prst="straightConnector1">
+            <a:avLst/>
+          </a:prstGeom>
+          <a:ln w="12700" cmpd="sng">
+            <a:solidFill>
+              <a:schemeClr val="tx1"/>
+            </a:solidFill>
+            <a:prstDash val="solid"/>
+            <a:tailEnd type="arrow"/>
+          </a:ln>
+        </p:spPr>
+        <p:style>
+          <a:lnRef idx="1">
+            <a:schemeClr val="accent1"/>
+          </a:lnRef>
+          <a:fillRef idx="0">
+            <a:schemeClr val="accent1"/>
+          </a:fillRef>
+          <a:effectRef idx="0">
+            <a:schemeClr val="accent1"/>
+          </a:effectRef>
+          <a:fontRef idx="minor">
+            <a:schemeClr val="tx1"/>
+          </a:fontRef>
+        </p:style>
+      </p:cxnSp>
+      <p:cxnSp>
+        <p:nvCxnSpPr>
+          <p:cNvPr id="9" name="Straight Arrow Connector 8"/>
+          <p:cNvCxnSpPr/>
+          <p:nvPr/>
+        </p:nvCxnSpPr>
+        <p:spPr>
+          <a:xfrm>
+            <a:off x="5621922" y="2816192"/>
+            <a:ext cx="0" cy="291465"/>
+          </a:xfrm>
+          <a:prstGeom prst="straightConnector1">
+            <a:avLst/>
+          </a:prstGeom>
+          <a:ln w="12700" cmpd="sng">
+            <a:solidFill>
+              <a:schemeClr val="tx1"/>
+            </a:solidFill>
+            <a:prstDash val="solid"/>
+            <a:tailEnd type="arrow"/>
+          </a:ln>
+        </p:spPr>
+        <p:style>
+          <a:lnRef idx="1">
+            <a:schemeClr val="accent1"/>
+          </a:lnRef>
+          <a:fillRef idx="0">
+            <a:schemeClr val="accent1"/>
+          </a:fillRef>
+          <a:effectRef idx="0">
+            <a:schemeClr val="accent1"/>
+          </a:effectRef>
+          <a:fontRef idx="minor">
+            <a:schemeClr val="tx1"/>
+          </a:fontRef>
+        </p:style>
+      </p:cxnSp>
+      <p:cxnSp>
+        <p:nvCxnSpPr>
+          <p:cNvPr id="11" name="Straight Arrow Connector 10"/>
+          <p:cNvCxnSpPr/>
+          <p:nvPr/>
+        </p:nvCxnSpPr>
+        <p:spPr>
+          <a:xfrm>
+            <a:off x="8584484" y="5675814"/>
+            <a:ext cx="0" cy="692902"/>
+          </a:xfrm>
+          <a:prstGeom prst="straightConnector1">
+            <a:avLst/>
+          </a:prstGeom>
+          <a:ln w="12700" cmpd="sng">
+            <a:solidFill>
+              <a:schemeClr val="tx1"/>
+            </a:solidFill>
+            <a:prstDash val="solid"/>
+            <a:tailEnd type="arrow"/>
+          </a:ln>
+        </p:spPr>
+        <p:style>
+          <a:lnRef idx="1">
+            <a:schemeClr val="accent1"/>
+          </a:lnRef>
+          <a:fillRef idx="0">
+            <a:schemeClr val="accent1"/>
+          </a:fillRef>
+          <a:effectRef idx="0">
+            <a:schemeClr val="accent1"/>
+          </a:effectRef>
+          <a:fontRef idx="minor">
+            <a:schemeClr val="tx1"/>
+          </a:fontRef>
+        </p:style>
+      </p:cxnSp>
+      <p:sp>
+        <p:nvSpPr>
+          <p:cNvPr id="12" name="Rectangles 18"/>
+          <p:cNvSpPr/>
+          <p:nvPr/>
+        </p:nvSpPr>
+        <p:spPr>
+          <a:xfrm>
+            <a:off x="4241165" y="3091647"/>
+            <a:ext cx="2715260" cy="642620"/>
+          </a:xfrm>
+          <a:prstGeom prst="rect">
+            <a:avLst/>
+          </a:prstGeom>
+          <a:gradFill>
+            <a:gsLst>
+              <a:gs pos="0">
+                <a:srgbClr val="14CD68"/>
+              </a:gs>
+              <a:gs pos="100000">
+                <a:srgbClr val="0B6E38"/>
+              </a:gs>
+            </a:gsLst>
+            <a:lin ang="5400000" scaled="0"/>
+          </a:gradFill>
+          <a:ln w="12700" cmpd="sng">
+            <a:solidFill>
+              <a:schemeClr val="tx1"/>
+            </a:solidFill>
+            <a:prstDash val="solid"/>
+          </a:ln>
+        </p:spPr>
+        <p:style>
+          <a:lnRef idx="2">
+            <a:schemeClr val="accent1">
+              <a:shade val="50000"/>
+            </a:schemeClr>
+          </a:lnRef>
+          <a:fillRef idx="1">
+            <a:schemeClr val="accent1"/>
+          </a:fillRef>
+          <a:effectRef idx="0">
+            <a:schemeClr val="accent1"/>
+          </a:effectRef>
+          <a:fontRef idx="minor">
+            <a:schemeClr val="lt1"/>
+          </a:fontRef>
+        </p:style>
+        <p:txBody>
+          <a:bodyPr rtlCol="0" anchor="ctr"/>
+          <a:lstStyle/>
+          <a:p>
+            <a:pPr algn="ctr"/>
+            <a:r>
+              <a:rPr lang="en-GB" dirty="0" smtClean="0">
+                <a:sym typeface="+mn-ea"/>
+              </a:rPr>
+              <a:t>c =  </a:t>
+            </a:r>
+            <a:r>
+              <a:rPr lang="en-GB" dirty="0" err="1" smtClean="0">
+                <a:sym typeface="+mn-ea"/>
+              </a:rPr>
+              <a:t>a+b</a:t>
+            </a:r>
+            <a:endParaRPr lang="en-US" dirty="0"/>
+          </a:p>
+        </p:txBody>
+      </p:sp>
+      <p:cxnSp>
+        <p:nvCxnSpPr>
+          <p:cNvPr id="13" name="Straight Arrow Connector 12"/>
+          <p:cNvCxnSpPr/>
+          <p:nvPr/>
+        </p:nvCxnSpPr>
+        <p:spPr>
+          <a:xfrm>
+            <a:off x="7206686" y="5229477"/>
+            <a:ext cx="381230" cy="0"/>
+          </a:xfrm>
+          <a:prstGeom prst="straightConnector1">
+            <a:avLst/>
+          </a:prstGeom>
+          <a:ln w="12700" cmpd="sng">
+            <a:solidFill>
+              <a:schemeClr val="tx1"/>
+            </a:solidFill>
+            <a:prstDash val="solid"/>
+            <a:tailEnd type="arrow"/>
+          </a:ln>
+        </p:spPr>
+        <p:style>
+          <a:lnRef idx="1">
+            <a:schemeClr val="accent1"/>
+          </a:lnRef>
+          <a:fillRef idx="0">
+            <a:schemeClr val="accent1"/>
+          </a:fillRef>
+          <a:effectRef idx="0">
+            <a:schemeClr val="accent1"/>
+          </a:effectRef>
+          <a:fontRef idx="minor">
+            <a:schemeClr val="tx1"/>
+          </a:fontRef>
+        </p:style>
+      </p:cxnSp>
+      <p:sp>
+        <p:nvSpPr>
+          <p:cNvPr id="16" name="Flowchart: Terminator 15"/>
+          <p:cNvSpPr/>
+          <p:nvPr/>
+        </p:nvSpPr>
+        <p:spPr>
+          <a:xfrm>
+            <a:off x="7506746" y="6389567"/>
+            <a:ext cx="2329815" cy="422275"/>
+          </a:xfrm>
+          <a:prstGeom prst="flowChartTerminator">
+            <a:avLst/>
+          </a:prstGeom>
+          <a:gradFill>
+            <a:gsLst>
+              <a:gs pos="0">
+                <a:srgbClr val="E30000"/>
+              </a:gs>
+              <a:gs pos="100000">
+                <a:srgbClr val="760303"/>
+              </a:gs>
+            </a:gsLst>
+            <a:lin ang="5400000" scaled="0"/>
+          </a:gradFill>
+          <a:ln w="12700" cmpd="sng">
+            <a:solidFill>
+              <a:schemeClr val="tx1"/>
+            </a:solidFill>
+            <a:prstDash val="solid"/>
+          </a:ln>
+        </p:spPr>
+        <p:style>
+          <a:lnRef idx="2">
+            <a:schemeClr val="accent1">
+              <a:shade val="50000"/>
+            </a:schemeClr>
+          </a:lnRef>
+          <a:fillRef idx="1">
+            <a:schemeClr val="accent1"/>
+          </a:fillRef>
+          <a:effectRef idx="0">
+            <a:schemeClr val="accent1"/>
+          </a:effectRef>
+          <a:fontRef idx="minor">
+            <a:schemeClr val="lt1"/>
+          </a:fontRef>
+        </p:style>
+        <p:txBody>
+          <a:bodyPr rtlCol="0" anchor="ctr"/>
+          <a:lstStyle/>
+          <a:p>
+            <a:pPr algn="ctr"/>
+            <a:r>
+              <a:rPr lang="en-US"/>
+              <a:t>END</a:t>
+            </a:r>
+          </a:p>
+        </p:txBody>
+      </p:sp>
+      <p:sp>
+        <p:nvSpPr>
+          <p:cNvPr id="17" name="Flowchart: Data 16"/>
+          <p:cNvSpPr/>
+          <p:nvPr/>
+        </p:nvSpPr>
+        <p:spPr>
+          <a:xfrm>
+            <a:off x="3742573" y="723582"/>
+            <a:ext cx="3721334" cy="498391"/>
+          </a:xfrm>
+          <a:prstGeom prst="flowChartInputOutput">
+            <a:avLst/>
+          </a:prstGeom>
+          <a:gradFill>
+            <a:gsLst>
+              <a:gs pos="0">
+                <a:srgbClr val="7B32B2"/>
+              </a:gs>
+              <a:gs pos="100000">
+                <a:srgbClr val="401A5D"/>
+              </a:gs>
+            </a:gsLst>
+            <a:lin ang="5400000" scaled="0"/>
+          </a:gradFill>
+          <a:ln w="12700" cmpd="sng">
+            <a:solidFill>
+              <a:schemeClr val="tx1"/>
+            </a:solidFill>
+            <a:prstDash val="solid"/>
+          </a:ln>
+        </p:spPr>
+        <p:style>
+          <a:lnRef idx="2">
+            <a:schemeClr val="accent1">
+              <a:shade val="50000"/>
+            </a:schemeClr>
+          </a:lnRef>
+          <a:fillRef idx="1">
+            <a:schemeClr val="accent1"/>
+          </a:fillRef>
+          <a:effectRef idx="0">
+            <a:schemeClr val="accent1"/>
+          </a:effectRef>
+          <a:fontRef idx="minor">
+            <a:schemeClr val="lt1"/>
+          </a:fontRef>
+        </p:style>
+        <p:txBody>
+          <a:bodyPr rtlCol="0" anchor="ctr"/>
+          <a:lstStyle/>
+          <a:p>
+            <a:r>
+              <a:rPr lang="en-GB" dirty="0">
+                <a:latin typeface="Times New Roman" panose="02020603050405020304" charset="0"/>
+                <a:cs typeface="Times New Roman" panose="02020603050405020304" charset="0"/>
+                <a:sym typeface="+mn-ea"/>
+              </a:rPr>
+              <a:t>declare either even or odds for each player</a:t>
+            </a:r>
+            <a:endParaRPr lang="en-US" dirty="0">
+              <a:latin typeface="Times New Roman" panose="02020603050405020304" charset="0"/>
+              <a:cs typeface="Times New Roman" panose="02020603050405020304" charset="0"/>
+              <a:sym typeface="+mn-ea"/>
+            </a:endParaRPr>
+          </a:p>
+        </p:txBody>
+      </p:sp>
+      <p:sp>
+        <p:nvSpPr>
+          <p:cNvPr id="18" name="Flowchart: Data 17"/>
+          <p:cNvSpPr/>
+          <p:nvPr/>
+        </p:nvSpPr>
+        <p:spPr>
+          <a:xfrm>
+            <a:off x="3706693" y="1517349"/>
+            <a:ext cx="3721334" cy="612775"/>
+          </a:xfrm>
+          <a:prstGeom prst="flowChartInputOutput">
+            <a:avLst/>
+          </a:prstGeom>
+          <a:gradFill>
+            <a:gsLst>
+              <a:gs pos="0">
+                <a:srgbClr val="7B32B2"/>
+              </a:gs>
+              <a:gs pos="100000">
+                <a:srgbClr val="401A5D"/>
+              </a:gs>
+            </a:gsLst>
+            <a:lin ang="5400000" scaled="0"/>
+          </a:gradFill>
+          <a:ln w="12700" cmpd="sng">
+            <a:solidFill>
+              <a:schemeClr val="tx1"/>
+            </a:solidFill>
+            <a:prstDash val="solid"/>
+          </a:ln>
+        </p:spPr>
+        <p:style>
+          <a:lnRef idx="2">
+            <a:schemeClr val="accent1">
+              <a:shade val="50000"/>
+            </a:schemeClr>
+          </a:lnRef>
+          <a:fillRef idx="1">
+            <a:schemeClr val="accent1"/>
+          </a:fillRef>
+          <a:effectRef idx="0">
+            <a:schemeClr val="accent1"/>
+          </a:effectRef>
+          <a:fontRef idx="minor">
+            <a:schemeClr val="lt1"/>
+          </a:fontRef>
+        </p:style>
+        <p:txBody>
+          <a:bodyPr rtlCol="0" anchor="ctr"/>
+          <a:lstStyle/>
+          <a:p>
+            <a:r>
+              <a:rPr lang="en-US" dirty="0" smtClean="0">
+                <a:latin typeface="Times New Roman" panose="02020603050405020304" charset="0"/>
+                <a:cs typeface="Times New Roman" panose="02020603050405020304" charset="0"/>
+                <a:sym typeface="+mn-ea"/>
+              </a:rPr>
+              <a:t>Enter number for player </a:t>
+            </a:r>
+            <a:r>
+              <a:rPr lang="en-US" dirty="0">
+                <a:latin typeface="Times New Roman" panose="02020603050405020304" charset="0"/>
+                <a:cs typeface="Times New Roman" panose="02020603050405020304" charset="0"/>
+                <a:sym typeface="+mn-ea"/>
+              </a:rPr>
+              <a:t>1, a</a:t>
+            </a:r>
+          </a:p>
+        </p:txBody>
+      </p:sp>
+      <p:sp>
+        <p:nvSpPr>
+          <p:cNvPr id="19" name="Flowchart: Data 18"/>
+          <p:cNvSpPr/>
+          <p:nvPr/>
+        </p:nvSpPr>
+        <p:spPr>
+          <a:xfrm>
+            <a:off x="3706693" y="2387115"/>
+            <a:ext cx="3721334" cy="429077"/>
+          </a:xfrm>
+          <a:prstGeom prst="flowChartInputOutput">
+            <a:avLst/>
+          </a:prstGeom>
+          <a:gradFill>
+            <a:gsLst>
+              <a:gs pos="0">
+                <a:srgbClr val="7B32B2"/>
+              </a:gs>
+              <a:gs pos="100000">
+                <a:srgbClr val="401A5D"/>
+              </a:gs>
+            </a:gsLst>
+            <a:lin ang="5400000" scaled="0"/>
+          </a:gradFill>
+          <a:ln w="12700" cmpd="sng">
+            <a:solidFill>
+              <a:schemeClr val="tx1"/>
+            </a:solidFill>
+            <a:prstDash val="solid"/>
+          </a:ln>
+        </p:spPr>
+        <p:style>
+          <a:lnRef idx="2">
+            <a:schemeClr val="accent1">
+              <a:shade val="50000"/>
+            </a:schemeClr>
+          </a:lnRef>
+          <a:fillRef idx="1">
+            <a:schemeClr val="accent1"/>
+          </a:fillRef>
+          <a:effectRef idx="0">
+            <a:schemeClr val="accent1"/>
+          </a:effectRef>
+          <a:fontRef idx="minor">
+            <a:schemeClr val="lt1"/>
+          </a:fontRef>
+        </p:style>
+        <p:txBody>
+          <a:bodyPr rtlCol="0" anchor="ctr"/>
+          <a:lstStyle/>
+          <a:p>
+            <a:r>
+              <a:rPr lang="en-US" dirty="0" smtClean="0">
+                <a:latin typeface="Times New Roman" panose="02020603050405020304" charset="0"/>
+                <a:cs typeface="Times New Roman" panose="02020603050405020304" charset="0"/>
+                <a:sym typeface="+mn-ea"/>
+              </a:rPr>
+              <a:t>Enter number for player 2, b</a:t>
+            </a:r>
+            <a:endParaRPr lang="en-US" dirty="0">
+              <a:latin typeface="Times New Roman" panose="02020603050405020304" charset="0"/>
+              <a:cs typeface="Times New Roman" panose="02020603050405020304" charset="0"/>
+              <a:sym typeface="+mn-ea"/>
+            </a:endParaRPr>
+          </a:p>
+        </p:txBody>
+      </p:sp>
+      <p:sp>
+        <p:nvSpPr>
+          <p:cNvPr id="20" name="Flowchart: Decision 19"/>
+          <p:cNvSpPr/>
+          <p:nvPr/>
+        </p:nvSpPr>
+        <p:spPr>
+          <a:xfrm>
+            <a:off x="4028005" y="4928872"/>
+            <a:ext cx="3187834" cy="601210"/>
+          </a:xfrm>
+          <a:prstGeom prst="flowChartDecision">
+            <a:avLst/>
+          </a:prstGeom>
+        </p:spPr>
+        <p:style>
+          <a:lnRef idx="2">
+            <a:schemeClr val="accent1">
+              <a:shade val="50000"/>
+            </a:schemeClr>
+          </a:lnRef>
+          <a:fillRef idx="1">
+            <a:schemeClr val="accent1"/>
+          </a:fillRef>
+          <a:effectRef idx="0">
+            <a:schemeClr val="accent1"/>
+          </a:effectRef>
+          <a:fontRef idx="minor">
+            <a:schemeClr val="lt1"/>
+          </a:fontRef>
+        </p:style>
+        <p:txBody>
+          <a:bodyPr rtlCol="0" anchor="ctr"/>
+          <a:lstStyle/>
+          <a:p>
+            <a:pPr algn="ctr"/>
+            <a:r>
+              <a:rPr lang="en-GB" dirty="0" smtClean="0"/>
+              <a:t>Is remainder==0</a:t>
+            </a:r>
+            <a:endParaRPr lang="en-US" dirty="0"/>
+          </a:p>
+        </p:txBody>
+      </p:sp>
+      <p:cxnSp>
+        <p:nvCxnSpPr>
+          <p:cNvPr id="21" name="Straight Arrow Connector 20"/>
+          <p:cNvCxnSpPr/>
+          <p:nvPr/>
+        </p:nvCxnSpPr>
+        <p:spPr>
+          <a:xfrm>
+            <a:off x="5594517" y="4629801"/>
+            <a:ext cx="0" cy="291465"/>
+          </a:xfrm>
+          <a:prstGeom prst="straightConnector1">
+            <a:avLst/>
+          </a:prstGeom>
+          <a:ln w="12700" cmpd="sng">
+            <a:solidFill>
+              <a:schemeClr val="tx1"/>
+            </a:solidFill>
+            <a:prstDash val="solid"/>
+            <a:tailEnd type="arrow"/>
+          </a:ln>
+        </p:spPr>
+        <p:style>
+          <a:lnRef idx="1">
+            <a:schemeClr val="accent1"/>
+          </a:lnRef>
+          <a:fillRef idx="0">
+            <a:schemeClr val="accent1"/>
+          </a:fillRef>
+          <a:effectRef idx="0">
+            <a:schemeClr val="accent1"/>
+          </a:effectRef>
+          <a:fontRef idx="minor">
+            <a:schemeClr val="tx1"/>
+          </a:fontRef>
+        </p:style>
+      </p:cxnSp>
+      <p:cxnSp>
+        <p:nvCxnSpPr>
+          <p:cNvPr id="22" name="Straight Arrow Connector 21"/>
+          <p:cNvCxnSpPr/>
+          <p:nvPr/>
+        </p:nvCxnSpPr>
+        <p:spPr>
+          <a:xfrm>
+            <a:off x="5642509" y="5530082"/>
+            <a:ext cx="0" cy="291465"/>
+          </a:xfrm>
+          <a:prstGeom prst="straightConnector1">
+            <a:avLst/>
+          </a:prstGeom>
+          <a:ln w="12700" cmpd="sng">
+            <a:solidFill>
+              <a:schemeClr val="tx1"/>
+            </a:solidFill>
+            <a:prstDash val="solid"/>
+            <a:tailEnd type="arrow"/>
+          </a:ln>
+        </p:spPr>
+        <p:style>
+          <a:lnRef idx="1">
+            <a:schemeClr val="accent1"/>
+          </a:lnRef>
+          <a:fillRef idx="0">
+            <a:schemeClr val="accent1"/>
+          </a:fillRef>
+          <a:effectRef idx="0">
+            <a:schemeClr val="accent1"/>
+          </a:effectRef>
+          <a:fontRef idx="minor">
+            <a:schemeClr val="tx1"/>
+          </a:fontRef>
+        </p:style>
+      </p:cxnSp>
+      <p:cxnSp>
+        <p:nvCxnSpPr>
+          <p:cNvPr id="23" name="Straight Arrow Connector 22"/>
+          <p:cNvCxnSpPr/>
+          <p:nvPr/>
+        </p:nvCxnSpPr>
+        <p:spPr>
+          <a:xfrm>
+            <a:off x="6509619" y="6247995"/>
+            <a:ext cx="2074865" cy="0"/>
+          </a:xfrm>
+          <a:prstGeom prst="straightConnector1">
+            <a:avLst/>
+          </a:prstGeom>
+          <a:ln w="12700" cmpd="sng">
+            <a:solidFill>
+              <a:schemeClr val="tx1"/>
+            </a:solidFill>
+            <a:prstDash val="solid"/>
+            <a:tailEnd type="arrow"/>
+          </a:ln>
+        </p:spPr>
+        <p:style>
+          <a:lnRef idx="1">
+            <a:schemeClr val="accent1"/>
+          </a:lnRef>
+          <a:fillRef idx="0">
+            <a:schemeClr val="accent1"/>
+          </a:fillRef>
+          <a:effectRef idx="0">
+            <a:schemeClr val="accent1"/>
+          </a:effectRef>
+          <a:fontRef idx="minor">
+            <a:schemeClr val="tx1"/>
+          </a:fontRef>
+        </p:style>
+      </p:cxnSp>
+      <p:sp>
+        <p:nvSpPr>
+          <p:cNvPr id="27" name="Rectangles 18"/>
+          <p:cNvSpPr/>
+          <p:nvPr/>
+        </p:nvSpPr>
+        <p:spPr>
+          <a:xfrm>
+            <a:off x="4225872" y="4000467"/>
+            <a:ext cx="2715260" cy="642620"/>
+          </a:xfrm>
+          <a:prstGeom prst="rect">
+            <a:avLst/>
+          </a:prstGeom>
+          <a:gradFill>
+            <a:gsLst>
+              <a:gs pos="0">
+                <a:srgbClr val="14CD68"/>
+              </a:gs>
+              <a:gs pos="100000">
+                <a:srgbClr val="0B6E38"/>
+              </a:gs>
+            </a:gsLst>
+            <a:lin ang="5400000" scaled="0"/>
+          </a:gradFill>
+          <a:ln w="12700" cmpd="sng">
+            <a:solidFill>
+              <a:schemeClr val="tx1"/>
+            </a:solidFill>
+            <a:prstDash val="solid"/>
+          </a:ln>
+        </p:spPr>
+        <p:style>
+          <a:lnRef idx="2">
+            <a:schemeClr val="accent1">
+              <a:shade val="50000"/>
+            </a:schemeClr>
+          </a:lnRef>
+          <a:fillRef idx="1">
+            <a:schemeClr val="accent1"/>
+          </a:fillRef>
+          <a:effectRef idx="0">
+            <a:schemeClr val="accent1"/>
+          </a:effectRef>
+          <a:fontRef idx="minor">
+            <a:schemeClr val="lt1"/>
+          </a:fontRef>
+        </p:style>
+        <p:txBody>
+          <a:bodyPr rtlCol="0" anchor="ctr"/>
+          <a:lstStyle/>
+          <a:p>
+            <a:pPr algn="ctr"/>
+            <a:r>
+              <a:rPr lang="en-GB" dirty="0" smtClean="0">
+                <a:sym typeface="+mn-ea"/>
+              </a:rPr>
+              <a:t>Divide c by 2</a:t>
+            </a:r>
+            <a:endParaRPr lang="en-US" dirty="0"/>
+          </a:p>
+        </p:txBody>
+      </p:sp>
+      <p:sp>
+        <p:nvSpPr>
+          <p:cNvPr id="30" name="Flowchart: Data 29"/>
+          <p:cNvSpPr/>
+          <p:nvPr/>
+        </p:nvSpPr>
+        <p:spPr>
+          <a:xfrm>
+            <a:off x="7332407" y="4834548"/>
+            <a:ext cx="2504154" cy="841266"/>
+          </a:xfrm>
+          <a:prstGeom prst="flowChartInputOutput">
+            <a:avLst/>
+          </a:prstGeom>
+          <a:gradFill>
+            <a:gsLst>
+              <a:gs pos="0">
+                <a:srgbClr val="7B32B2"/>
+              </a:gs>
+              <a:gs pos="100000">
+                <a:srgbClr val="401A5D"/>
+              </a:gs>
+            </a:gsLst>
+            <a:lin ang="5400000" scaled="0"/>
+          </a:gradFill>
+          <a:ln w="12700" cmpd="sng">
+            <a:solidFill>
+              <a:schemeClr val="tx1"/>
+            </a:solidFill>
+            <a:prstDash val="solid"/>
+          </a:ln>
+        </p:spPr>
+        <p:style>
+          <a:lnRef idx="2">
+            <a:schemeClr val="accent1">
+              <a:shade val="50000"/>
+            </a:schemeClr>
+          </a:lnRef>
+          <a:fillRef idx="1">
+            <a:schemeClr val="accent1"/>
+          </a:fillRef>
+          <a:effectRef idx="0">
+            <a:schemeClr val="accent1"/>
+          </a:effectRef>
+          <a:fontRef idx="minor">
+            <a:schemeClr val="lt1"/>
+          </a:fontRef>
+        </p:style>
+        <p:txBody>
+          <a:bodyPr rtlCol="0" anchor="ctr"/>
+          <a:lstStyle/>
+          <a:p>
+            <a:r>
+              <a:rPr lang="en-GB" dirty="0" smtClean="0">
+                <a:latin typeface="Times New Roman" panose="02020603050405020304" charset="0"/>
+                <a:cs typeface="Times New Roman" panose="02020603050405020304" charset="0"/>
+                <a:sym typeface="+mn-ea"/>
+              </a:rPr>
+              <a:t>Player that declared even wins</a:t>
+            </a:r>
+            <a:endParaRPr lang="en-US" dirty="0">
+              <a:latin typeface="Times New Roman" panose="02020603050405020304" charset="0"/>
+              <a:cs typeface="Times New Roman" panose="02020603050405020304" charset="0"/>
+              <a:sym typeface="+mn-ea"/>
+            </a:endParaRPr>
+          </a:p>
+        </p:txBody>
+      </p:sp>
+      <p:sp>
+        <p:nvSpPr>
+          <p:cNvPr id="31" name="Flowchart: Data 30"/>
+          <p:cNvSpPr/>
+          <p:nvPr/>
+        </p:nvSpPr>
+        <p:spPr>
+          <a:xfrm>
+            <a:off x="4241165" y="5827362"/>
+            <a:ext cx="2504154" cy="841266"/>
+          </a:xfrm>
+          <a:prstGeom prst="flowChartInputOutput">
+            <a:avLst/>
+          </a:prstGeom>
+          <a:gradFill>
+            <a:gsLst>
+              <a:gs pos="0">
+                <a:srgbClr val="7B32B2"/>
+              </a:gs>
+              <a:gs pos="100000">
+                <a:srgbClr val="401A5D"/>
+              </a:gs>
+            </a:gsLst>
+            <a:lin ang="5400000" scaled="0"/>
+          </a:gradFill>
+          <a:ln w="12700" cmpd="sng">
+            <a:solidFill>
+              <a:schemeClr val="tx1"/>
+            </a:solidFill>
+            <a:prstDash val="solid"/>
+          </a:ln>
+        </p:spPr>
+        <p:style>
+          <a:lnRef idx="2">
+            <a:schemeClr val="accent1">
+              <a:shade val="50000"/>
+            </a:schemeClr>
+          </a:lnRef>
+          <a:fillRef idx="1">
+            <a:schemeClr val="accent1"/>
+          </a:fillRef>
+          <a:effectRef idx="0">
+            <a:schemeClr val="accent1"/>
+          </a:effectRef>
+          <a:fontRef idx="minor">
+            <a:schemeClr val="lt1"/>
+          </a:fontRef>
+        </p:style>
+        <p:txBody>
+          <a:bodyPr rtlCol="0" anchor="ctr"/>
+          <a:lstStyle/>
+          <a:p>
+            <a:r>
+              <a:rPr lang="en-GB" dirty="0" smtClean="0">
+                <a:latin typeface="Times New Roman" panose="02020603050405020304" charset="0"/>
+                <a:cs typeface="Times New Roman" panose="02020603050405020304" charset="0"/>
+                <a:sym typeface="+mn-ea"/>
+              </a:rPr>
+              <a:t>Player that declared odd wins</a:t>
+            </a:r>
+            <a:endParaRPr lang="en-US" dirty="0">
+              <a:latin typeface="Times New Roman" panose="02020603050405020304" charset="0"/>
+              <a:cs typeface="Times New Roman" panose="02020603050405020304" charset="0"/>
+              <a:sym typeface="+mn-ea"/>
+            </a:endParaRPr>
+          </a:p>
+        </p:txBody>
+      </p:sp>
+      <p:sp>
+        <p:nvSpPr>
+          <p:cNvPr id="35" name="TextBox 34"/>
+          <p:cNvSpPr txBox="1"/>
+          <p:nvPr/>
+        </p:nvSpPr>
+        <p:spPr>
+          <a:xfrm>
+            <a:off x="7206686" y="4928872"/>
+            <a:ext cx="790710" cy="369332"/>
+          </a:xfrm>
+          <a:prstGeom prst="rect">
+            <a:avLst/>
+          </a:prstGeom>
+          <a:noFill/>
+        </p:spPr>
+        <p:txBody>
+          <a:bodyPr wrap="square" rtlCol="0">
+            <a:spAutoFit/>
+          </a:bodyPr>
+          <a:lstStyle/>
+          <a:p>
+            <a:r>
+              <a:rPr lang="en-GB" dirty="0" smtClean="0"/>
+              <a:t>YES</a:t>
+            </a:r>
+            <a:endParaRPr lang="en-US" dirty="0"/>
+          </a:p>
+        </p:txBody>
+      </p:sp>
+      <p:sp>
+        <p:nvSpPr>
+          <p:cNvPr id="36" name="TextBox 35"/>
+          <p:cNvSpPr txBox="1"/>
+          <p:nvPr/>
+        </p:nvSpPr>
+        <p:spPr>
+          <a:xfrm>
+            <a:off x="6941132" y="5961599"/>
+            <a:ext cx="775870" cy="369332"/>
+          </a:xfrm>
+          <a:prstGeom prst="rect">
+            <a:avLst/>
+          </a:prstGeom>
+          <a:noFill/>
+        </p:spPr>
+        <p:txBody>
+          <a:bodyPr wrap="square" rtlCol="0">
+            <a:spAutoFit/>
+          </a:bodyPr>
+          <a:lstStyle/>
+          <a:p>
+            <a:r>
+              <a:rPr lang="en-GB" dirty="0" smtClean="0"/>
+              <a:t>NO</a:t>
+            </a:r>
+            <a:endParaRPr lang="en-US" dirty="0"/>
+          </a:p>
+        </p:txBody>
+      </p:sp>
+    </p:spTree>
+    <p:extLst>
+      <p:ext uri="{BB962C8B-B14F-4D97-AF65-F5344CB8AC3E}">
+        <p14:creationId xmlns:p14="http://schemas.microsoft.com/office/powerpoint/2010/main" val="197513522"/>
+      </p:ext>
+    </p:extLst>
+  </p:cSld>
+  <p:clrMapOvr>
+    <a:masterClrMapping/>
+  </p:clrMapOvr>
+</p:sld>
+</file>
+
+<file path=ppt/slides/slide6.xml><?xml version="1.0" encoding="utf-8"?>
+<p:sld xmlns:a="http://schemas.openxmlformats.org/drawingml/2006/main" xmlns:r="http://schemas.openxmlformats.org/officeDocument/2006/relationships" xmlns:p="http://schemas.openxmlformats.org/presentationml/2006/main">
+  <p:cSld>
+    <p:spTree>
+      <p:nvGrpSpPr>
+        <p:cNvPr id="1" name=""/>
+        <p:cNvGrpSpPr/>
+        <p:nvPr/>
+      </p:nvGrpSpPr>
+      <p:grpSpPr>
+        <a:xfrm>
+          <a:off x="0" y="0"/>
+          <a:ext cx="0" cy="0"/>
+          <a:chOff x="0" y="0"/>
+          <a:chExt cx="0" cy="0"/>
+        </a:xfrm>
+      </p:grpSpPr>
+      <p:sp>
+        <p:nvSpPr>
+          <p:cNvPr id="5" name="Content Placeholder 4"/>
+          <p:cNvSpPr>
+            <a:spLocks noGrp="1"/>
+          </p:cNvSpPr>
+          <p:nvPr>
+            <p:ph idx="1"/>
+          </p:nvPr>
+        </p:nvSpPr>
+        <p:spPr>
+          <a:xfrm>
+            <a:off x="838200" y="269240"/>
+            <a:ext cx="10515600" cy="5928360"/>
+          </a:xfrm>
+        </p:spPr>
+        <p:txBody>
+          <a:bodyPr/>
+          <a:lstStyle/>
+          <a:p>
+            <a:r>
+              <a:rPr lang="en-US" dirty="0">
+                <a:latin typeface="Times New Roman" panose="02020603050405020304" charset="0"/>
+                <a:cs typeface="Times New Roman" panose="02020603050405020304" charset="0"/>
+              </a:rPr>
+              <a:t>Step1: START</a:t>
+            </a:r>
+          </a:p>
+          <a:p>
+            <a:r>
+              <a:rPr lang="en-US" dirty="0">
+                <a:latin typeface="Times New Roman" panose="02020603050405020304" charset="0"/>
+                <a:cs typeface="Times New Roman" panose="02020603050405020304" charset="0"/>
+                <a:sym typeface="+mn-ea"/>
+              </a:rPr>
+              <a:t>Step 2: Import pandas</a:t>
+            </a:r>
+            <a:endParaRPr lang="en-US" dirty="0">
+              <a:latin typeface="Times New Roman" panose="02020603050405020304" charset="0"/>
+              <a:cs typeface="Times New Roman" panose="02020603050405020304" charset="0"/>
+            </a:endParaRPr>
+          </a:p>
+          <a:p>
+            <a:r>
+              <a:rPr lang="en-US" dirty="0">
+                <a:latin typeface="Times New Roman" panose="02020603050405020304" charset="0"/>
+                <a:cs typeface="Times New Roman" panose="02020603050405020304" charset="0"/>
+              </a:rPr>
+              <a:t>Step 3: </a:t>
+            </a:r>
+            <a:r>
+              <a:rPr lang="en-US" dirty="0"/>
+              <a:t>Assign variables to R&amp;D Spend, Administration, Marketing spend, State, </a:t>
+            </a:r>
+            <a:r>
+              <a:rPr lang="en-US" dirty="0" smtClean="0"/>
+              <a:t>Profit</a:t>
+            </a:r>
+            <a:endParaRPr lang="en-US" dirty="0">
+              <a:latin typeface="Times New Roman" panose="02020603050405020304" charset="0"/>
+              <a:cs typeface="Times New Roman" panose="02020603050405020304" charset="0"/>
+            </a:endParaRPr>
+          </a:p>
+          <a:p>
+            <a:r>
+              <a:rPr lang="en-US" dirty="0">
+                <a:latin typeface="Times New Roman" panose="02020603050405020304" charset="0"/>
+                <a:cs typeface="Times New Roman" panose="02020603050405020304" charset="0"/>
+              </a:rPr>
+              <a:t>Step 4: Create a dictionary, </a:t>
+            </a:r>
+            <a:r>
+              <a:rPr lang="en-US" dirty="0" smtClean="0">
+                <a:latin typeface="Times New Roman" panose="02020603050405020304" charset="0"/>
+                <a:cs typeface="Times New Roman" panose="02020603050405020304" charset="0"/>
+              </a:rPr>
+              <a:t>bat</a:t>
+            </a:r>
+            <a:r>
+              <a:rPr lang="en-US" dirty="0" smtClean="0">
+                <a:latin typeface="Times New Roman" panose="02020603050405020304" charset="0"/>
+                <a:cs typeface="Times New Roman" panose="02020603050405020304" charset="0"/>
+              </a:rPr>
+              <a:t>, </a:t>
+            </a:r>
+            <a:r>
+              <a:rPr lang="en-US" dirty="0">
+                <a:latin typeface="Times New Roman" panose="02020603050405020304" charset="0"/>
+                <a:cs typeface="Times New Roman" panose="02020603050405020304" charset="0"/>
+              </a:rPr>
+              <a:t>for the variables assigned</a:t>
+            </a:r>
+          </a:p>
+          <a:p>
+            <a:r>
+              <a:rPr lang="en-US" dirty="0">
+                <a:latin typeface="Times New Roman" panose="02020603050405020304" charset="0"/>
+                <a:cs typeface="Times New Roman" panose="02020603050405020304" charset="0"/>
+              </a:rPr>
+              <a:t>Step 5: Convert </a:t>
+            </a:r>
+            <a:r>
+              <a:rPr lang="en-US" dirty="0" smtClean="0">
+                <a:latin typeface="Times New Roman" panose="02020603050405020304" charset="0"/>
+                <a:cs typeface="Times New Roman" panose="02020603050405020304" charset="0"/>
+              </a:rPr>
+              <a:t>bat</a:t>
+            </a:r>
+            <a:r>
+              <a:rPr lang="en-US" dirty="0" smtClean="0">
+                <a:latin typeface="Times New Roman" panose="02020603050405020304" charset="0"/>
+                <a:cs typeface="Times New Roman" panose="02020603050405020304" charset="0"/>
+              </a:rPr>
+              <a:t> </a:t>
+            </a:r>
+            <a:r>
+              <a:rPr lang="en-US" dirty="0">
+                <a:latin typeface="Times New Roman" panose="02020603050405020304" charset="0"/>
+                <a:cs typeface="Times New Roman" panose="02020603050405020304" charset="0"/>
+              </a:rPr>
+              <a:t>to </a:t>
+            </a:r>
+            <a:r>
+              <a:rPr lang="en-US" dirty="0" err="1">
+                <a:latin typeface="Times New Roman" panose="02020603050405020304" charset="0"/>
+                <a:cs typeface="Times New Roman" panose="02020603050405020304" charset="0"/>
+              </a:rPr>
+              <a:t>dataframe</a:t>
+            </a:r>
+            <a:r>
+              <a:rPr lang="en-US" dirty="0">
+                <a:latin typeface="Times New Roman" panose="02020603050405020304" charset="0"/>
+                <a:cs typeface="Times New Roman" panose="02020603050405020304" charset="0"/>
+              </a:rPr>
+              <a:t> using pandas</a:t>
+            </a:r>
+          </a:p>
+          <a:p>
+            <a:r>
+              <a:rPr lang="en-US" dirty="0">
+                <a:latin typeface="Times New Roman" panose="02020603050405020304" charset="0"/>
+                <a:cs typeface="Times New Roman" panose="02020603050405020304" charset="0"/>
+              </a:rPr>
+              <a:t>Step 6: View data</a:t>
+            </a:r>
+          </a:p>
+          <a:p>
+            <a:r>
+              <a:rPr lang="en-US" dirty="0">
+                <a:latin typeface="Times New Roman" panose="02020603050405020304" charset="0"/>
+                <a:cs typeface="Times New Roman" panose="02020603050405020304" charset="0"/>
+              </a:rPr>
+              <a:t>Step 7: Save data in working directory</a:t>
+            </a:r>
+          </a:p>
+          <a:p>
+            <a:pPr marL="0" indent="0">
+              <a:buNone/>
+            </a:pPr>
+            <a:endParaRPr lang="en-US" dirty="0">
+              <a:latin typeface="Times New Roman" panose="02020603050405020304" charset="0"/>
+              <a:cs typeface="Times New Roman" panose="02020603050405020304" charset="0"/>
+            </a:endParaRPr>
+          </a:p>
+        </p:txBody>
+      </p:sp>
+    </p:spTree>
+    <p:extLst>
+      <p:ext uri="{BB962C8B-B14F-4D97-AF65-F5344CB8AC3E}">
+        <p14:creationId xmlns:p14="http://schemas.microsoft.com/office/powerpoint/2010/main" val="4284301566"/>
+      </p:ext>
+    </p:extLst>
+  </p:cSld>
+  <p:clrMapOvr>
+    <a:masterClrMapping/>
+  </p:clrMapOvr>
+</p:sld>
+</file>
+
+<file path=ppt/slides/slide7.xml><?xml version="1.0" encoding="utf-8"?>
+<p:sld xmlns:a="http://schemas.openxmlformats.org/drawingml/2006/main" xmlns:r="http://schemas.openxmlformats.org/officeDocument/2006/relationships" xmlns:p="http://schemas.openxmlformats.org/presentationml/2006/main">
+  <p:cSld>
+    <p:spTree>
+      <p:nvGrpSpPr>
+        <p:cNvPr id="1" name=""/>
+        <p:cNvGrpSpPr/>
+        <p:nvPr/>
+      </p:nvGrpSpPr>
+      <p:grpSpPr>
+        <a:xfrm>
+          <a:off x="0" y="0"/>
+          <a:ext cx="0" cy="0"/>
+          <a:chOff x="0" y="0"/>
+          <a:chExt cx="0" cy="0"/>
+        </a:xfrm>
+      </p:grpSpPr>
+      <p:sp>
+        <p:nvSpPr>
+          <p:cNvPr id="2" name="Flowchart: Terminator 1"/>
+          <p:cNvSpPr/>
+          <p:nvPr/>
+        </p:nvSpPr>
+        <p:spPr>
+          <a:xfrm>
+            <a:off x="4407535" y="200660"/>
+            <a:ext cx="2329815" cy="422275"/>
+          </a:xfrm>
+          <a:prstGeom prst="flowChartTerminator">
+            <a:avLst/>
+          </a:prstGeom>
+          <a:gradFill>
+            <a:gsLst>
+              <a:gs pos="0">
+                <a:srgbClr val="E30000"/>
+              </a:gs>
+              <a:gs pos="100000">
+                <a:srgbClr val="760303"/>
+              </a:gs>
+            </a:gsLst>
+            <a:lin ang="5400000" scaled="0"/>
+          </a:gradFill>
+          <a:ln w="12700" cmpd="sng">
+            <a:solidFill>
+              <a:schemeClr val="tx1"/>
+            </a:solidFill>
+            <a:prstDash val="solid"/>
+          </a:ln>
+        </p:spPr>
+        <p:style>
+          <a:lnRef idx="2">
+            <a:schemeClr val="accent1">
+              <a:shade val="50000"/>
+            </a:schemeClr>
+          </a:lnRef>
+          <a:fillRef idx="1">
+            <a:schemeClr val="accent1"/>
+          </a:fillRef>
+          <a:effectRef idx="0">
+            <a:schemeClr val="accent1"/>
+          </a:effectRef>
+          <a:fontRef idx="minor">
+            <a:schemeClr val="lt1"/>
+          </a:fontRef>
+        </p:style>
+        <p:txBody>
+          <a:bodyPr rtlCol="0" anchor="ctr"/>
+          <a:lstStyle/>
+          <a:p>
+            <a:pPr algn="ctr"/>
+            <a:r>
+              <a:rPr lang="en-US"/>
+              <a:t>START</a:t>
+            </a:r>
+          </a:p>
+        </p:txBody>
+      </p:sp>
+      <p:cxnSp>
+        <p:nvCxnSpPr>
+          <p:cNvPr id="3" name="Straight Arrow Connector 2"/>
+          <p:cNvCxnSpPr/>
+          <p:nvPr/>
+        </p:nvCxnSpPr>
+        <p:spPr>
+          <a:xfrm>
+            <a:off x="5577840" y="622935"/>
+            <a:ext cx="10795" cy="300990"/>
+          </a:xfrm>
+          <a:prstGeom prst="straightConnector1">
+            <a:avLst/>
+          </a:prstGeom>
+          <a:ln w="12700" cmpd="sng">
+            <a:solidFill>
+              <a:schemeClr val="tx1"/>
+            </a:solidFill>
+            <a:prstDash val="solid"/>
+            <a:tailEnd type="arrow"/>
+          </a:ln>
+        </p:spPr>
+        <p:style>
+          <a:lnRef idx="1">
+            <a:schemeClr val="accent1"/>
+          </a:lnRef>
+          <a:fillRef idx="0">
+            <a:schemeClr val="accent1"/>
+          </a:fillRef>
+          <a:effectRef idx="0">
+            <a:schemeClr val="accent1"/>
+          </a:effectRef>
+          <a:fontRef idx="minor">
+            <a:schemeClr val="tx1"/>
+          </a:fontRef>
+        </p:style>
+      </p:cxnSp>
+      <p:cxnSp>
+        <p:nvCxnSpPr>
+          <p:cNvPr id="4" name="Straight Arrow Connector 3"/>
+          <p:cNvCxnSpPr/>
+          <p:nvPr/>
+        </p:nvCxnSpPr>
+        <p:spPr>
+          <a:xfrm>
+            <a:off x="5588635" y="1382395"/>
+            <a:ext cx="4445" cy="224790"/>
+          </a:xfrm>
+          <a:prstGeom prst="straightConnector1">
+            <a:avLst/>
+          </a:prstGeom>
+          <a:ln w="12700" cmpd="sng">
+            <a:solidFill>
+              <a:schemeClr val="tx1"/>
+            </a:solidFill>
+            <a:prstDash val="solid"/>
+            <a:tailEnd type="arrow"/>
+          </a:ln>
+        </p:spPr>
+        <p:style>
+          <a:lnRef idx="1">
+            <a:schemeClr val="accent1"/>
+          </a:lnRef>
+          <a:fillRef idx="0">
+            <a:schemeClr val="accent1"/>
+          </a:fillRef>
+          <a:effectRef idx="0">
+            <a:schemeClr val="accent1"/>
+          </a:effectRef>
+          <a:fontRef idx="minor">
+            <a:schemeClr val="tx1"/>
+          </a:fontRef>
+        </p:style>
+      </p:cxnSp>
+      <p:cxnSp>
+        <p:nvCxnSpPr>
+          <p:cNvPr id="5" name="Straight Arrow Connector 4"/>
+          <p:cNvCxnSpPr/>
+          <p:nvPr/>
+        </p:nvCxnSpPr>
+        <p:spPr>
+          <a:xfrm>
+            <a:off x="5603240" y="2249805"/>
+            <a:ext cx="0" cy="291465"/>
+          </a:xfrm>
+          <a:prstGeom prst="straightConnector1">
+            <a:avLst/>
+          </a:prstGeom>
+          <a:ln w="12700" cmpd="sng">
+            <a:solidFill>
+              <a:schemeClr val="tx1"/>
+            </a:solidFill>
+            <a:prstDash val="solid"/>
+            <a:tailEnd type="arrow"/>
+          </a:ln>
+        </p:spPr>
+        <p:style>
+          <a:lnRef idx="1">
+            <a:schemeClr val="accent1"/>
+          </a:lnRef>
+          <a:fillRef idx="0">
+            <a:schemeClr val="accent1"/>
+          </a:fillRef>
+          <a:effectRef idx="0">
+            <a:schemeClr val="accent1"/>
+          </a:effectRef>
+          <a:fontRef idx="minor">
+            <a:schemeClr val="tx1"/>
+          </a:fontRef>
+        </p:style>
+      </p:cxnSp>
+      <p:cxnSp>
+        <p:nvCxnSpPr>
+          <p:cNvPr id="6" name="Straight Arrow Connector 5"/>
+          <p:cNvCxnSpPr/>
+          <p:nvPr/>
+        </p:nvCxnSpPr>
+        <p:spPr>
+          <a:xfrm flipH="1">
+            <a:off x="5605780" y="4117975"/>
+            <a:ext cx="8255" cy="269240"/>
+          </a:xfrm>
+          <a:prstGeom prst="straightConnector1">
+            <a:avLst/>
+          </a:prstGeom>
+          <a:ln w="12700" cmpd="sng">
+            <a:solidFill>
+              <a:schemeClr val="tx1"/>
+            </a:solidFill>
+            <a:prstDash val="solid"/>
+            <a:tailEnd type="arrow"/>
+          </a:ln>
+        </p:spPr>
+        <p:style>
+          <a:lnRef idx="1">
+            <a:schemeClr val="accent1"/>
+          </a:lnRef>
+          <a:fillRef idx="0">
+            <a:schemeClr val="accent1"/>
+          </a:fillRef>
+          <a:effectRef idx="0">
+            <a:schemeClr val="accent1"/>
+          </a:effectRef>
+          <a:fontRef idx="minor">
+            <a:schemeClr val="tx1"/>
+          </a:fontRef>
+        </p:style>
+      </p:cxnSp>
+      <p:sp>
+        <p:nvSpPr>
+          <p:cNvPr id="7" name="Rectangles 11"/>
+          <p:cNvSpPr/>
+          <p:nvPr/>
+        </p:nvSpPr>
+        <p:spPr>
+          <a:xfrm>
+            <a:off x="3465095" y="923925"/>
+            <a:ext cx="4620125" cy="458470"/>
+          </a:xfrm>
+          <a:prstGeom prst="rect">
+            <a:avLst/>
+          </a:prstGeom>
+          <a:gradFill>
+            <a:gsLst>
+              <a:gs pos="0">
+                <a:srgbClr val="14CD68"/>
+              </a:gs>
+              <a:gs pos="100000">
+                <a:srgbClr val="0B6E38"/>
+              </a:gs>
+            </a:gsLst>
+            <a:lin ang="5400000" scaled="0"/>
+          </a:gradFill>
+          <a:ln w="12700" cmpd="sng">
+            <a:solidFill>
+              <a:schemeClr val="tx1"/>
+            </a:solidFill>
+            <a:prstDash val="solid"/>
+          </a:ln>
+        </p:spPr>
+        <p:style>
+          <a:lnRef idx="2">
+            <a:schemeClr val="accent1">
+              <a:shade val="50000"/>
+            </a:schemeClr>
+          </a:lnRef>
+          <a:fillRef idx="1">
+            <a:schemeClr val="accent1"/>
+          </a:fillRef>
+          <a:effectRef idx="0">
+            <a:schemeClr val="accent1"/>
+          </a:effectRef>
+          <a:fontRef idx="minor">
+            <a:schemeClr val="lt1"/>
+          </a:fontRef>
+        </p:style>
+        <p:txBody>
+          <a:bodyPr rtlCol="0" anchor="ctr"/>
+          <a:lstStyle/>
+          <a:p>
+            <a:pPr algn="ctr"/>
+            <a:r>
+              <a:rPr lang="en-US"/>
+              <a:t>Import pandas</a:t>
+            </a:r>
+          </a:p>
+        </p:txBody>
+      </p:sp>
+      <p:sp>
+        <p:nvSpPr>
+          <p:cNvPr id="8" name="Rectangles 12"/>
+          <p:cNvSpPr/>
+          <p:nvPr/>
+        </p:nvSpPr>
+        <p:spPr>
+          <a:xfrm>
+            <a:off x="3465095" y="1592263"/>
+            <a:ext cx="4620125" cy="642620"/>
+          </a:xfrm>
+          <a:prstGeom prst="rect">
+            <a:avLst/>
+          </a:prstGeom>
+          <a:gradFill>
+            <a:gsLst>
+              <a:gs pos="0">
+                <a:srgbClr val="14CD68"/>
+              </a:gs>
+              <a:gs pos="100000">
+                <a:srgbClr val="0B6E38"/>
+              </a:gs>
+            </a:gsLst>
+            <a:lin ang="5400000" scaled="0"/>
+          </a:gradFill>
+          <a:ln w="12700" cmpd="sng">
+            <a:solidFill>
+              <a:schemeClr val="tx1"/>
+            </a:solidFill>
+            <a:prstDash val="solid"/>
+          </a:ln>
+        </p:spPr>
+        <p:style>
+          <a:lnRef idx="2">
+            <a:schemeClr val="accent1">
+              <a:shade val="50000"/>
+            </a:schemeClr>
+          </a:lnRef>
+          <a:fillRef idx="1">
+            <a:schemeClr val="accent1"/>
+          </a:fillRef>
+          <a:effectRef idx="0">
+            <a:schemeClr val="accent1"/>
+          </a:effectRef>
+          <a:fontRef idx="minor">
+            <a:schemeClr val="lt1"/>
+          </a:fontRef>
+        </p:style>
+        <p:txBody>
+          <a:bodyPr rtlCol="0" anchor="ctr"/>
+          <a:lstStyle/>
+          <a:p>
+            <a:pPr algn="ctr"/>
+            <a:r>
+              <a:rPr lang="en-US" dirty="0"/>
+              <a:t>Assign variables to </a:t>
+            </a:r>
+            <a:r>
+              <a:rPr lang="en-US" dirty="0" smtClean="0"/>
+              <a:t>R&amp;D Spend, Administration, Marketing spend, State, Profit</a:t>
+            </a:r>
+            <a:endParaRPr lang="en-US" dirty="0"/>
+          </a:p>
+        </p:txBody>
+      </p:sp>
+      <p:cxnSp>
+        <p:nvCxnSpPr>
+          <p:cNvPr id="9" name="Straight Arrow Connector 8"/>
+          <p:cNvCxnSpPr/>
+          <p:nvPr/>
+        </p:nvCxnSpPr>
+        <p:spPr>
+          <a:xfrm>
+            <a:off x="5605780" y="3183890"/>
+            <a:ext cx="0" cy="291465"/>
+          </a:xfrm>
+          <a:prstGeom prst="straightConnector1">
+            <a:avLst/>
+          </a:prstGeom>
+          <a:ln w="12700" cmpd="sng">
+            <a:solidFill>
+              <a:schemeClr val="tx1"/>
+            </a:solidFill>
+            <a:prstDash val="solid"/>
+            <a:tailEnd type="arrow"/>
+          </a:ln>
+        </p:spPr>
+        <p:style>
+          <a:lnRef idx="1">
+            <a:schemeClr val="accent1"/>
+          </a:lnRef>
+          <a:fillRef idx="0">
+            <a:schemeClr val="accent1"/>
+          </a:fillRef>
+          <a:effectRef idx="0">
+            <a:schemeClr val="accent1"/>
+          </a:effectRef>
+          <a:fontRef idx="minor">
+            <a:schemeClr val="tx1"/>
+          </a:fontRef>
+        </p:style>
+      </p:cxnSp>
+      <p:sp>
+        <p:nvSpPr>
+          <p:cNvPr id="10" name="Rectangles 14"/>
+          <p:cNvSpPr/>
+          <p:nvPr/>
+        </p:nvSpPr>
+        <p:spPr>
+          <a:xfrm>
+            <a:off x="3465095" y="2541270"/>
+            <a:ext cx="4620125" cy="642620"/>
+          </a:xfrm>
+          <a:prstGeom prst="rect">
+            <a:avLst/>
+          </a:prstGeom>
+          <a:gradFill>
+            <a:gsLst>
+              <a:gs pos="0">
+                <a:srgbClr val="14CD68"/>
+              </a:gs>
+              <a:gs pos="100000">
+                <a:srgbClr val="0B6E38"/>
+              </a:gs>
+            </a:gsLst>
+            <a:lin ang="5400000" scaled="0"/>
+          </a:gradFill>
+          <a:ln w="12700" cmpd="sng">
+            <a:solidFill>
+              <a:schemeClr val="tx1"/>
+            </a:solidFill>
+            <a:prstDash val="solid"/>
+          </a:ln>
+        </p:spPr>
+        <p:style>
+          <a:lnRef idx="2">
+            <a:schemeClr val="accent1">
+              <a:shade val="50000"/>
+            </a:schemeClr>
+          </a:lnRef>
+          <a:fillRef idx="1">
+            <a:schemeClr val="accent1"/>
+          </a:fillRef>
+          <a:effectRef idx="0">
+            <a:schemeClr val="accent1"/>
+          </a:effectRef>
+          <a:fontRef idx="minor">
+            <a:schemeClr val="lt1"/>
+          </a:fontRef>
+        </p:style>
+        <p:txBody>
+          <a:bodyPr rtlCol="0" anchor="ctr"/>
+          <a:lstStyle/>
+          <a:p>
+            <a:pPr algn="ctr"/>
+            <a:r>
+              <a:rPr lang="en-US" dirty="0">
+                <a:sym typeface="+mn-ea"/>
+              </a:rPr>
+              <a:t>Create a dictionary, </a:t>
+            </a:r>
+            <a:r>
+              <a:rPr lang="en-US" dirty="0" smtClean="0">
+                <a:sym typeface="+mn-ea"/>
+              </a:rPr>
+              <a:t>bat, </a:t>
+            </a:r>
+            <a:r>
+              <a:rPr lang="en-US" dirty="0">
+                <a:sym typeface="+mn-ea"/>
+              </a:rPr>
+              <a:t>for the variables assigned</a:t>
+            </a:r>
+            <a:endParaRPr lang="en-US" dirty="0"/>
+          </a:p>
+        </p:txBody>
+      </p:sp>
+      <p:cxnSp>
+        <p:nvCxnSpPr>
+          <p:cNvPr id="11" name="Straight Arrow Connector 10"/>
+          <p:cNvCxnSpPr/>
+          <p:nvPr/>
+        </p:nvCxnSpPr>
+        <p:spPr>
+          <a:xfrm>
+            <a:off x="5614035" y="5934075"/>
+            <a:ext cx="0" cy="291465"/>
+          </a:xfrm>
+          <a:prstGeom prst="straightConnector1">
+            <a:avLst/>
+          </a:prstGeom>
+          <a:ln w="12700" cmpd="sng">
+            <a:solidFill>
+              <a:schemeClr val="tx1"/>
+            </a:solidFill>
+            <a:prstDash val="solid"/>
+            <a:tailEnd type="arrow"/>
+          </a:ln>
+        </p:spPr>
+        <p:style>
+          <a:lnRef idx="1">
+            <a:schemeClr val="accent1"/>
+          </a:lnRef>
+          <a:fillRef idx="0">
+            <a:schemeClr val="accent1"/>
+          </a:fillRef>
+          <a:effectRef idx="0">
+            <a:schemeClr val="accent1"/>
+          </a:effectRef>
+          <a:fontRef idx="minor">
+            <a:schemeClr val="tx1"/>
+          </a:fontRef>
+        </p:style>
+      </p:cxnSp>
+      <p:sp>
+        <p:nvSpPr>
+          <p:cNvPr id="12" name="Rectangles 18"/>
+          <p:cNvSpPr/>
+          <p:nvPr/>
+        </p:nvSpPr>
+        <p:spPr>
+          <a:xfrm>
+            <a:off x="3465095" y="3475355"/>
+            <a:ext cx="4620125" cy="642620"/>
+          </a:xfrm>
+          <a:prstGeom prst="rect">
+            <a:avLst/>
+          </a:prstGeom>
+          <a:gradFill>
+            <a:gsLst>
+              <a:gs pos="0">
+                <a:srgbClr val="14CD68"/>
+              </a:gs>
+              <a:gs pos="100000">
+                <a:srgbClr val="0B6E38"/>
+              </a:gs>
+            </a:gsLst>
+            <a:lin ang="5400000" scaled="0"/>
+          </a:gradFill>
+          <a:ln w="12700" cmpd="sng">
+            <a:solidFill>
+              <a:schemeClr val="tx1"/>
+            </a:solidFill>
+            <a:prstDash val="solid"/>
+          </a:ln>
+        </p:spPr>
+        <p:style>
+          <a:lnRef idx="2">
+            <a:schemeClr val="accent1">
+              <a:shade val="50000"/>
+            </a:schemeClr>
+          </a:lnRef>
+          <a:fillRef idx="1">
+            <a:schemeClr val="accent1"/>
+          </a:fillRef>
+          <a:effectRef idx="0">
+            <a:schemeClr val="accent1"/>
+          </a:effectRef>
+          <a:fontRef idx="minor">
+            <a:schemeClr val="lt1"/>
+          </a:fontRef>
+        </p:style>
+        <p:txBody>
+          <a:bodyPr rtlCol="0" anchor="ctr"/>
+          <a:lstStyle/>
+          <a:p>
+            <a:pPr algn="ctr"/>
+            <a:r>
+              <a:rPr lang="en-US" dirty="0">
+                <a:sym typeface="+mn-ea"/>
+              </a:rPr>
+              <a:t>Convert </a:t>
+            </a:r>
+            <a:r>
+              <a:rPr lang="en-US" dirty="0" smtClean="0">
+                <a:sym typeface="+mn-ea"/>
+              </a:rPr>
+              <a:t>bat</a:t>
+            </a:r>
+            <a:r>
+              <a:rPr lang="en-US" dirty="0" smtClean="0">
+                <a:sym typeface="+mn-ea"/>
+              </a:rPr>
+              <a:t> </a:t>
+            </a:r>
+            <a:r>
+              <a:rPr lang="en-US" dirty="0">
+                <a:sym typeface="+mn-ea"/>
+              </a:rPr>
+              <a:t>to </a:t>
+            </a:r>
+            <a:r>
+              <a:rPr lang="en-US" dirty="0" err="1">
+                <a:sym typeface="+mn-ea"/>
+              </a:rPr>
+              <a:t>dataframe</a:t>
+            </a:r>
+            <a:r>
+              <a:rPr lang="en-US" dirty="0">
+                <a:sym typeface="+mn-ea"/>
+              </a:rPr>
+              <a:t> using pandas</a:t>
+            </a:r>
+            <a:endParaRPr lang="en-US" dirty="0"/>
+          </a:p>
+        </p:txBody>
+      </p:sp>
+      <p:cxnSp>
+        <p:nvCxnSpPr>
+          <p:cNvPr id="13" name="Straight Arrow Connector 12"/>
+          <p:cNvCxnSpPr/>
+          <p:nvPr/>
+        </p:nvCxnSpPr>
+        <p:spPr>
+          <a:xfrm>
+            <a:off x="5603240" y="4999990"/>
+            <a:ext cx="0" cy="291465"/>
+          </a:xfrm>
+          <a:prstGeom prst="straightConnector1">
+            <a:avLst/>
+          </a:prstGeom>
+          <a:ln w="12700" cmpd="sng">
+            <a:solidFill>
+              <a:schemeClr val="tx1"/>
+            </a:solidFill>
+            <a:prstDash val="solid"/>
+            <a:tailEnd type="arrow"/>
+          </a:ln>
+        </p:spPr>
+        <p:style>
+          <a:lnRef idx="1">
+            <a:schemeClr val="accent1"/>
+          </a:lnRef>
+          <a:fillRef idx="0">
+            <a:schemeClr val="accent1"/>
+          </a:fillRef>
+          <a:effectRef idx="0">
+            <a:schemeClr val="accent1"/>
+          </a:effectRef>
+          <a:fontRef idx="minor">
+            <a:schemeClr val="tx1"/>
+          </a:fontRef>
+        </p:style>
+      </p:cxnSp>
+      <p:sp>
+        <p:nvSpPr>
+          <p:cNvPr id="14" name="Rectangles 20"/>
+          <p:cNvSpPr/>
+          <p:nvPr/>
+        </p:nvSpPr>
+        <p:spPr>
+          <a:xfrm>
+            <a:off x="3465096" y="5291455"/>
+            <a:ext cx="4620124" cy="642620"/>
+          </a:xfrm>
+          <a:prstGeom prst="rect">
+            <a:avLst/>
+          </a:prstGeom>
+          <a:gradFill>
+            <a:gsLst>
+              <a:gs pos="0">
+                <a:srgbClr val="14CD68"/>
+              </a:gs>
+              <a:gs pos="100000">
+                <a:srgbClr val="0B6E38"/>
+              </a:gs>
+            </a:gsLst>
+            <a:lin ang="5400000" scaled="0"/>
+          </a:gradFill>
+          <a:ln w="12700" cmpd="sng">
+            <a:solidFill>
+              <a:schemeClr val="tx1"/>
+            </a:solidFill>
+            <a:prstDash val="solid"/>
+          </a:ln>
+        </p:spPr>
+        <p:style>
+          <a:lnRef idx="2">
+            <a:schemeClr val="accent1">
+              <a:shade val="50000"/>
+            </a:schemeClr>
+          </a:lnRef>
+          <a:fillRef idx="1">
+            <a:schemeClr val="accent1"/>
+          </a:fillRef>
+          <a:effectRef idx="0">
+            <a:schemeClr val="accent1"/>
+          </a:effectRef>
+          <a:fontRef idx="minor">
+            <a:schemeClr val="lt1"/>
+          </a:fontRef>
+        </p:style>
+        <p:txBody>
+          <a:bodyPr rtlCol="0" anchor="ctr"/>
+          <a:lstStyle/>
+          <a:p>
+            <a:pPr algn="ctr"/>
+            <a:r>
+              <a:rPr lang="en-US">
+                <a:sym typeface="+mn-ea"/>
+              </a:rPr>
+              <a:t>Save data in working directory</a:t>
+            </a:r>
             <a:endParaRPr lang="en-US"/>
           </a:p>
         </p:txBody>
       </p:sp>
+      <p:sp>
+        <p:nvSpPr>
+          <p:cNvPr id="15" name="Flowchart: Data 14"/>
+          <p:cNvSpPr/>
+          <p:nvPr/>
+        </p:nvSpPr>
+        <p:spPr>
+          <a:xfrm>
+            <a:off x="4252595" y="4387215"/>
+            <a:ext cx="2714625" cy="612775"/>
+          </a:xfrm>
+          <a:prstGeom prst="flowChartInputOutput">
+            <a:avLst/>
+          </a:prstGeom>
+          <a:gradFill>
+            <a:gsLst>
+              <a:gs pos="0">
+                <a:srgbClr val="7B32B2"/>
+              </a:gs>
+              <a:gs pos="100000">
+                <a:srgbClr val="401A5D"/>
+              </a:gs>
+            </a:gsLst>
+            <a:lin ang="5400000" scaled="0"/>
+          </a:gradFill>
+          <a:ln w="12700" cmpd="sng">
+            <a:solidFill>
+              <a:schemeClr val="tx1"/>
+            </a:solidFill>
+            <a:prstDash val="solid"/>
+          </a:ln>
+        </p:spPr>
+        <p:style>
+          <a:lnRef idx="2">
+            <a:schemeClr val="accent1">
+              <a:shade val="50000"/>
+            </a:schemeClr>
+          </a:lnRef>
+          <a:fillRef idx="1">
+            <a:schemeClr val="accent1"/>
+          </a:fillRef>
+          <a:effectRef idx="0">
+            <a:schemeClr val="accent1"/>
+          </a:effectRef>
+          <a:fontRef idx="minor">
+            <a:schemeClr val="lt1"/>
+          </a:fontRef>
+        </p:style>
+        <p:txBody>
+          <a:bodyPr rtlCol="0" anchor="ctr"/>
+          <a:lstStyle/>
+          <a:p>
+            <a:pPr algn="ctr"/>
+            <a:r>
+              <a:rPr lang="en-US"/>
+              <a:t>View data </a:t>
+            </a:r>
+          </a:p>
+        </p:txBody>
+      </p:sp>
+      <p:sp>
+        <p:nvSpPr>
+          <p:cNvPr id="16" name="Flowchart: Terminator 15"/>
+          <p:cNvSpPr/>
+          <p:nvPr/>
+        </p:nvSpPr>
+        <p:spPr>
+          <a:xfrm>
+            <a:off x="4449445" y="6225540"/>
+            <a:ext cx="2329815" cy="422275"/>
+          </a:xfrm>
+          <a:prstGeom prst="flowChartTerminator">
+            <a:avLst/>
+          </a:prstGeom>
+          <a:gradFill>
+            <a:gsLst>
+              <a:gs pos="0">
+                <a:srgbClr val="E30000"/>
+              </a:gs>
+              <a:gs pos="100000">
+                <a:srgbClr val="760303"/>
+              </a:gs>
+            </a:gsLst>
+            <a:lin ang="5400000" scaled="0"/>
+          </a:gradFill>
+          <a:ln w="12700" cmpd="sng">
+            <a:solidFill>
+              <a:schemeClr val="tx1"/>
+            </a:solidFill>
+            <a:prstDash val="solid"/>
+          </a:ln>
+        </p:spPr>
+        <p:style>
+          <a:lnRef idx="2">
+            <a:schemeClr val="accent1">
+              <a:shade val="50000"/>
+            </a:schemeClr>
+          </a:lnRef>
+          <a:fillRef idx="1">
+            <a:schemeClr val="accent1"/>
+          </a:fillRef>
+          <a:effectRef idx="0">
+            <a:schemeClr val="accent1"/>
+          </a:effectRef>
+          <a:fontRef idx="minor">
+            <a:schemeClr val="lt1"/>
+          </a:fontRef>
+        </p:style>
+        <p:txBody>
+          <a:bodyPr rtlCol="0" anchor="ctr"/>
+          <a:lstStyle/>
+          <a:p>
+            <a:pPr algn="ctr"/>
+            <a:r>
+              <a:rPr lang="en-US"/>
+              <a:t>END</a:t>
+            </a:r>
+          </a:p>
+        </p:txBody>
+      </p:sp>
     </p:spTree>
+    <p:extLst>
+      <p:ext uri="{BB962C8B-B14F-4D97-AF65-F5344CB8AC3E}">
+        <p14:creationId xmlns:p14="http://schemas.microsoft.com/office/powerpoint/2010/main" val="1652086416"/>
+      </p:ext>
+    </p:extLst>
+  </p:cSld>
+  <p:clrMapOvr>
+    <a:masterClrMapping/>
+  </p:clrMapOvr>
+</p:sld>
+</file>
+
+<file path=ppt/slides/slide8.xml><?xml version="1.0" encoding="utf-8"?>
+<p:sld xmlns:a="http://schemas.openxmlformats.org/drawingml/2006/main" xmlns:r="http://schemas.openxmlformats.org/officeDocument/2006/relationships" xmlns:p="http://schemas.openxmlformats.org/presentationml/2006/main">
+  <p:cSld>
+    <p:spTree>
+      <p:nvGrpSpPr>
+        <p:cNvPr id="1" name=""/>
+        <p:cNvGrpSpPr/>
+        <p:nvPr/>
+      </p:nvGrpSpPr>
+      <p:grpSpPr>
+        <a:xfrm>
+          <a:off x="0" y="0"/>
+          <a:ext cx="0" cy="0"/>
+          <a:chOff x="0" y="0"/>
+          <a:chExt cx="0" cy="0"/>
+        </a:xfrm>
+      </p:grpSpPr>
+      <p:sp>
+        <p:nvSpPr>
+          <p:cNvPr id="3" name="Content Placeholder 2"/>
+          <p:cNvSpPr>
+            <a:spLocks noGrp="1"/>
+          </p:cNvSpPr>
+          <p:nvPr>
+            <p:ph idx="1"/>
+          </p:nvPr>
+        </p:nvSpPr>
+        <p:spPr>
+          <a:xfrm>
+            <a:off x="838200" y="385011"/>
+            <a:ext cx="10515600" cy="5791952"/>
+          </a:xfrm>
+        </p:spPr>
+        <p:txBody>
+          <a:bodyPr/>
+          <a:lstStyle/>
+          <a:p>
+            <a:pPr marL="0" indent="0">
+              <a:buNone/>
+            </a:pPr>
+            <a:r>
+              <a:rPr lang="en-GB" dirty="0" smtClean="0"/>
+              <a:t>Step 1: START</a:t>
+            </a:r>
+          </a:p>
+          <a:p>
+            <a:pPr marL="0" indent="0">
+              <a:buNone/>
+            </a:pPr>
+            <a:r>
+              <a:rPr lang="en-GB" dirty="0" smtClean="0"/>
+              <a:t>Step 2: INPUT distance, a</a:t>
+            </a:r>
+          </a:p>
+          <a:p>
+            <a:pPr marL="0" indent="0">
+              <a:buNone/>
+            </a:pPr>
+            <a:r>
+              <a:rPr lang="en-GB" dirty="0" smtClean="0"/>
+              <a:t>Step 3: INPUT time, b</a:t>
+            </a:r>
+          </a:p>
+          <a:p>
+            <a:pPr marL="0" indent="0">
+              <a:buNone/>
+            </a:pPr>
+            <a:r>
+              <a:rPr lang="en-GB" dirty="0" smtClean="0"/>
+              <a:t>Step 4: COMPUTE c = a/b </a:t>
+            </a:r>
+          </a:p>
+          <a:p>
+            <a:pPr marL="0" indent="0">
+              <a:buNone/>
+            </a:pPr>
+            <a:r>
+              <a:rPr lang="en-GB" dirty="0" smtClean="0"/>
+              <a:t>Step 5: PRINT c</a:t>
+            </a:r>
+          </a:p>
+        </p:txBody>
+      </p:sp>
+    </p:spTree>
+    <p:extLst>
+      <p:ext uri="{BB962C8B-B14F-4D97-AF65-F5344CB8AC3E}">
+        <p14:creationId xmlns:p14="http://schemas.microsoft.com/office/powerpoint/2010/main" val="2490596152"/>
+      </p:ext>
+    </p:extLst>
+  </p:cSld>
+  <p:clrMapOvr>
+    <a:masterClrMapping/>
+  </p:clrMapOvr>
+</p:sld>
+</file>
+
+<file path=ppt/slides/slide9.xml><?xml version="1.0" encoding="utf-8"?>
+<p:sld xmlns:a="http://schemas.openxmlformats.org/drawingml/2006/main" xmlns:r="http://schemas.openxmlformats.org/officeDocument/2006/relationships" xmlns:p="http://schemas.openxmlformats.org/presentationml/2006/main">
+  <p:cSld>
+    <p:spTree>
+      <p:nvGrpSpPr>
+        <p:cNvPr id="1" name=""/>
+        <p:cNvGrpSpPr/>
+        <p:nvPr/>
+      </p:nvGrpSpPr>
+      <p:grpSpPr>
+        <a:xfrm>
+          <a:off x="0" y="0"/>
+          <a:ext cx="0" cy="0"/>
+          <a:chOff x="0" y="0"/>
+          <a:chExt cx="0" cy="0"/>
+        </a:xfrm>
+      </p:grpSpPr>
+      <p:sp>
+        <p:nvSpPr>
+          <p:cNvPr id="2" name="Flowchart: Terminator 1"/>
+          <p:cNvSpPr/>
+          <p:nvPr/>
+        </p:nvSpPr>
+        <p:spPr>
+          <a:xfrm>
+            <a:off x="4407533" y="9842"/>
+            <a:ext cx="2329815" cy="422275"/>
+          </a:xfrm>
+          <a:prstGeom prst="flowChartTerminator">
+            <a:avLst/>
+          </a:prstGeom>
+          <a:gradFill>
+            <a:gsLst>
+              <a:gs pos="0">
+                <a:srgbClr val="E30000"/>
+              </a:gs>
+              <a:gs pos="100000">
+                <a:srgbClr val="760303"/>
+              </a:gs>
+            </a:gsLst>
+            <a:lin ang="5400000" scaled="0"/>
+          </a:gradFill>
+          <a:ln w="12700" cmpd="sng">
+            <a:solidFill>
+              <a:schemeClr val="tx1"/>
+            </a:solidFill>
+            <a:prstDash val="solid"/>
+          </a:ln>
+        </p:spPr>
+        <p:style>
+          <a:lnRef idx="2">
+            <a:schemeClr val="accent1">
+              <a:shade val="50000"/>
+            </a:schemeClr>
+          </a:lnRef>
+          <a:fillRef idx="1">
+            <a:schemeClr val="accent1"/>
+          </a:fillRef>
+          <a:effectRef idx="0">
+            <a:schemeClr val="accent1"/>
+          </a:effectRef>
+          <a:fontRef idx="minor">
+            <a:schemeClr val="lt1"/>
+          </a:fontRef>
+        </p:style>
+        <p:txBody>
+          <a:bodyPr rtlCol="0" anchor="ctr"/>
+          <a:lstStyle/>
+          <a:p>
+            <a:pPr algn="ctr"/>
+            <a:r>
+              <a:rPr lang="en-US"/>
+              <a:t>START</a:t>
+            </a:r>
+          </a:p>
+        </p:txBody>
+      </p:sp>
+      <p:cxnSp>
+        <p:nvCxnSpPr>
+          <p:cNvPr id="3" name="Straight Arrow Connector 2"/>
+          <p:cNvCxnSpPr/>
+          <p:nvPr/>
+        </p:nvCxnSpPr>
+        <p:spPr>
+          <a:xfrm flipH="1">
+            <a:off x="5567360" y="449079"/>
+            <a:ext cx="5080" cy="300990"/>
+          </a:xfrm>
+          <a:prstGeom prst="straightConnector1">
+            <a:avLst/>
+          </a:prstGeom>
+          <a:ln w="12700" cmpd="sng">
+            <a:solidFill>
+              <a:schemeClr val="tx1"/>
+            </a:solidFill>
+            <a:prstDash val="solid"/>
+            <a:tailEnd type="arrow"/>
+          </a:ln>
+        </p:spPr>
+        <p:style>
+          <a:lnRef idx="1">
+            <a:schemeClr val="accent1"/>
+          </a:lnRef>
+          <a:fillRef idx="0">
+            <a:schemeClr val="accent1"/>
+          </a:fillRef>
+          <a:effectRef idx="0">
+            <a:schemeClr val="accent1"/>
+          </a:effectRef>
+          <a:fontRef idx="minor">
+            <a:schemeClr val="tx1"/>
+          </a:fontRef>
+        </p:style>
+      </p:cxnSp>
+      <p:cxnSp>
+        <p:nvCxnSpPr>
+          <p:cNvPr id="4" name="Straight Arrow Connector 3"/>
+          <p:cNvCxnSpPr/>
+          <p:nvPr/>
+        </p:nvCxnSpPr>
+        <p:spPr>
+          <a:xfrm>
+            <a:off x="5598795" y="1284404"/>
+            <a:ext cx="4445" cy="224790"/>
+          </a:xfrm>
+          <a:prstGeom prst="straightConnector1">
+            <a:avLst/>
+          </a:prstGeom>
+          <a:ln w="12700" cmpd="sng">
+            <a:solidFill>
+              <a:schemeClr val="tx1"/>
+            </a:solidFill>
+            <a:prstDash val="solid"/>
+            <a:tailEnd type="arrow"/>
+          </a:ln>
+        </p:spPr>
+        <p:style>
+          <a:lnRef idx="1">
+            <a:schemeClr val="accent1"/>
+          </a:lnRef>
+          <a:fillRef idx="0">
+            <a:schemeClr val="accent1"/>
+          </a:fillRef>
+          <a:effectRef idx="0">
+            <a:schemeClr val="accent1"/>
+          </a:effectRef>
+          <a:fontRef idx="minor">
+            <a:schemeClr val="tx1"/>
+          </a:fontRef>
+        </p:style>
+      </p:cxnSp>
+      <p:cxnSp>
+        <p:nvCxnSpPr>
+          <p:cNvPr id="5" name="Straight Arrow Connector 4"/>
+          <p:cNvCxnSpPr/>
+          <p:nvPr/>
+        </p:nvCxnSpPr>
+        <p:spPr>
+          <a:xfrm>
+            <a:off x="5605780" y="2130124"/>
+            <a:ext cx="8255" cy="260150"/>
+          </a:xfrm>
+          <a:prstGeom prst="straightConnector1">
+            <a:avLst/>
+          </a:prstGeom>
+          <a:ln w="12700" cmpd="sng">
+            <a:solidFill>
+              <a:schemeClr val="tx1"/>
+            </a:solidFill>
+            <a:prstDash val="solid"/>
+            <a:tailEnd type="arrow"/>
+          </a:ln>
+        </p:spPr>
+        <p:style>
+          <a:lnRef idx="1">
+            <a:schemeClr val="accent1"/>
+          </a:lnRef>
+          <a:fillRef idx="0">
+            <a:schemeClr val="accent1"/>
+          </a:fillRef>
+          <a:effectRef idx="0">
+            <a:schemeClr val="accent1"/>
+          </a:effectRef>
+          <a:fontRef idx="minor">
+            <a:schemeClr val="tx1"/>
+          </a:fontRef>
+        </p:style>
+      </p:cxnSp>
+      <p:cxnSp>
+        <p:nvCxnSpPr>
+          <p:cNvPr id="8" name="Straight Arrow Connector 7"/>
+          <p:cNvCxnSpPr/>
+          <p:nvPr/>
+        </p:nvCxnSpPr>
+        <p:spPr>
+          <a:xfrm>
+            <a:off x="5583908" y="4336452"/>
+            <a:ext cx="0" cy="692902"/>
+          </a:xfrm>
+          <a:prstGeom prst="straightConnector1">
+            <a:avLst/>
+          </a:prstGeom>
+          <a:ln w="12700" cmpd="sng">
+            <a:solidFill>
+              <a:schemeClr val="tx1"/>
+            </a:solidFill>
+            <a:prstDash val="solid"/>
+            <a:tailEnd type="arrow"/>
+          </a:ln>
+        </p:spPr>
+        <p:style>
+          <a:lnRef idx="1">
+            <a:schemeClr val="accent1"/>
+          </a:lnRef>
+          <a:fillRef idx="0">
+            <a:schemeClr val="accent1"/>
+          </a:fillRef>
+          <a:effectRef idx="0">
+            <a:schemeClr val="accent1"/>
+          </a:effectRef>
+          <a:fontRef idx="minor">
+            <a:schemeClr val="tx1"/>
+          </a:fontRef>
+        </p:style>
+      </p:cxnSp>
+      <p:sp>
+        <p:nvSpPr>
+          <p:cNvPr id="9" name="Rectangles 18"/>
+          <p:cNvSpPr/>
+          <p:nvPr/>
+        </p:nvSpPr>
+        <p:spPr>
+          <a:xfrm>
+            <a:off x="4209128" y="2388754"/>
+            <a:ext cx="2715260" cy="642620"/>
+          </a:xfrm>
+          <a:prstGeom prst="rect">
+            <a:avLst/>
+          </a:prstGeom>
+          <a:gradFill>
+            <a:gsLst>
+              <a:gs pos="0">
+                <a:srgbClr val="14CD68"/>
+              </a:gs>
+              <a:gs pos="100000">
+                <a:srgbClr val="0B6E38"/>
+              </a:gs>
+            </a:gsLst>
+            <a:lin ang="5400000" scaled="0"/>
+          </a:gradFill>
+          <a:ln w="12700" cmpd="sng">
+            <a:solidFill>
+              <a:schemeClr val="tx1"/>
+            </a:solidFill>
+            <a:prstDash val="solid"/>
+          </a:ln>
+        </p:spPr>
+        <p:style>
+          <a:lnRef idx="2">
+            <a:schemeClr val="accent1">
+              <a:shade val="50000"/>
+            </a:schemeClr>
+          </a:lnRef>
+          <a:fillRef idx="1">
+            <a:schemeClr val="accent1"/>
+          </a:fillRef>
+          <a:effectRef idx="0">
+            <a:schemeClr val="accent1"/>
+          </a:effectRef>
+          <a:fontRef idx="minor">
+            <a:schemeClr val="lt1"/>
+          </a:fontRef>
+        </p:style>
+        <p:txBody>
+          <a:bodyPr rtlCol="0" anchor="ctr"/>
+          <a:lstStyle/>
+          <a:p>
+            <a:pPr algn="ctr"/>
+            <a:r>
+              <a:rPr lang="en-GB" dirty="0" smtClean="0">
+                <a:sym typeface="+mn-ea"/>
+              </a:rPr>
+              <a:t>c =  a/b</a:t>
+            </a:r>
+            <a:endParaRPr lang="en-US" dirty="0"/>
+          </a:p>
+        </p:txBody>
+      </p:sp>
+      <p:sp>
+        <p:nvSpPr>
+          <p:cNvPr id="11" name="Flowchart: Terminator 10"/>
+          <p:cNvSpPr/>
+          <p:nvPr/>
+        </p:nvSpPr>
+        <p:spPr>
+          <a:xfrm>
+            <a:off x="4419000" y="5029354"/>
+            <a:ext cx="2329815" cy="422275"/>
+          </a:xfrm>
+          <a:prstGeom prst="flowChartTerminator">
+            <a:avLst/>
+          </a:prstGeom>
+          <a:gradFill>
+            <a:gsLst>
+              <a:gs pos="0">
+                <a:srgbClr val="E30000"/>
+              </a:gs>
+              <a:gs pos="100000">
+                <a:srgbClr val="760303"/>
+              </a:gs>
+            </a:gsLst>
+            <a:lin ang="5400000" scaled="0"/>
+          </a:gradFill>
+          <a:ln w="12700" cmpd="sng">
+            <a:solidFill>
+              <a:schemeClr val="tx1"/>
+            </a:solidFill>
+            <a:prstDash val="solid"/>
+          </a:ln>
+        </p:spPr>
+        <p:style>
+          <a:lnRef idx="2">
+            <a:schemeClr val="accent1">
+              <a:shade val="50000"/>
+            </a:schemeClr>
+          </a:lnRef>
+          <a:fillRef idx="1">
+            <a:schemeClr val="accent1"/>
+          </a:fillRef>
+          <a:effectRef idx="0">
+            <a:schemeClr val="accent1"/>
+          </a:effectRef>
+          <a:fontRef idx="minor">
+            <a:schemeClr val="lt1"/>
+          </a:fontRef>
+        </p:style>
+        <p:txBody>
+          <a:bodyPr rtlCol="0" anchor="ctr"/>
+          <a:lstStyle/>
+          <a:p>
+            <a:pPr algn="ctr"/>
+            <a:r>
+              <a:rPr lang="en-US"/>
+              <a:t>END</a:t>
+            </a:r>
+          </a:p>
+        </p:txBody>
+      </p:sp>
+      <p:sp>
+        <p:nvSpPr>
+          <p:cNvPr id="12" name="Flowchart: Data 11"/>
+          <p:cNvSpPr/>
+          <p:nvPr/>
+        </p:nvSpPr>
+        <p:spPr>
+          <a:xfrm>
+            <a:off x="3742573" y="723582"/>
+            <a:ext cx="3721334" cy="498391"/>
+          </a:xfrm>
+          <a:prstGeom prst="flowChartInputOutput">
+            <a:avLst/>
+          </a:prstGeom>
+          <a:gradFill>
+            <a:gsLst>
+              <a:gs pos="0">
+                <a:srgbClr val="7B32B2"/>
+              </a:gs>
+              <a:gs pos="100000">
+                <a:srgbClr val="401A5D"/>
+              </a:gs>
+            </a:gsLst>
+            <a:lin ang="5400000" scaled="0"/>
+          </a:gradFill>
+          <a:ln w="12700" cmpd="sng">
+            <a:solidFill>
+              <a:schemeClr val="tx1"/>
+            </a:solidFill>
+            <a:prstDash val="solid"/>
+          </a:ln>
+        </p:spPr>
+        <p:style>
+          <a:lnRef idx="2">
+            <a:schemeClr val="accent1">
+              <a:shade val="50000"/>
+            </a:schemeClr>
+          </a:lnRef>
+          <a:fillRef idx="1">
+            <a:schemeClr val="accent1"/>
+          </a:fillRef>
+          <a:effectRef idx="0">
+            <a:schemeClr val="accent1"/>
+          </a:effectRef>
+          <a:fontRef idx="minor">
+            <a:schemeClr val="lt1"/>
+          </a:fontRef>
+        </p:style>
+        <p:txBody>
+          <a:bodyPr rtlCol="0" anchor="ctr"/>
+          <a:lstStyle/>
+          <a:p>
+            <a:r>
+              <a:rPr lang="en-GB" dirty="0" smtClean="0"/>
+              <a:t>Enter distance</a:t>
+            </a:r>
+            <a:r>
+              <a:rPr lang="en-GB" dirty="0"/>
+              <a:t>, a</a:t>
+            </a:r>
+          </a:p>
+        </p:txBody>
+      </p:sp>
+      <p:sp>
+        <p:nvSpPr>
+          <p:cNvPr id="13" name="Flowchart: Data 12"/>
+          <p:cNvSpPr/>
+          <p:nvPr/>
+        </p:nvSpPr>
+        <p:spPr>
+          <a:xfrm>
+            <a:off x="3706693" y="1517349"/>
+            <a:ext cx="3721334" cy="612775"/>
+          </a:xfrm>
+          <a:prstGeom prst="flowChartInputOutput">
+            <a:avLst/>
+          </a:prstGeom>
+          <a:gradFill>
+            <a:gsLst>
+              <a:gs pos="0">
+                <a:srgbClr val="7B32B2"/>
+              </a:gs>
+              <a:gs pos="100000">
+                <a:srgbClr val="401A5D"/>
+              </a:gs>
+            </a:gsLst>
+            <a:lin ang="5400000" scaled="0"/>
+          </a:gradFill>
+          <a:ln w="12700" cmpd="sng">
+            <a:solidFill>
+              <a:schemeClr val="tx1"/>
+            </a:solidFill>
+            <a:prstDash val="solid"/>
+          </a:ln>
+        </p:spPr>
+        <p:style>
+          <a:lnRef idx="2">
+            <a:schemeClr val="accent1">
+              <a:shade val="50000"/>
+            </a:schemeClr>
+          </a:lnRef>
+          <a:fillRef idx="1">
+            <a:schemeClr val="accent1"/>
+          </a:fillRef>
+          <a:effectRef idx="0">
+            <a:schemeClr val="accent1"/>
+          </a:effectRef>
+          <a:fontRef idx="minor">
+            <a:schemeClr val="lt1"/>
+          </a:fontRef>
+        </p:style>
+        <p:txBody>
+          <a:bodyPr rtlCol="0" anchor="ctr"/>
+          <a:lstStyle/>
+          <a:p>
+            <a:r>
+              <a:rPr lang="en-US" dirty="0" smtClean="0">
+                <a:latin typeface="Times New Roman" panose="02020603050405020304" charset="0"/>
+                <a:cs typeface="Times New Roman" panose="02020603050405020304" charset="0"/>
+                <a:sym typeface="+mn-ea"/>
+              </a:rPr>
+              <a:t>Enter time, b</a:t>
+            </a:r>
+            <a:endParaRPr lang="en-US" dirty="0">
+              <a:latin typeface="Times New Roman" panose="02020603050405020304" charset="0"/>
+              <a:cs typeface="Times New Roman" panose="02020603050405020304" charset="0"/>
+              <a:sym typeface="+mn-ea"/>
+            </a:endParaRPr>
+          </a:p>
+        </p:txBody>
+      </p:sp>
+      <p:cxnSp>
+        <p:nvCxnSpPr>
+          <p:cNvPr id="16" name="Straight Arrow Connector 15"/>
+          <p:cNvCxnSpPr/>
+          <p:nvPr/>
+        </p:nvCxnSpPr>
+        <p:spPr>
+          <a:xfrm flipH="1">
+            <a:off x="5598695" y="2999079"/>
+            <a:ext cx="100" cy="496107"/>
+          </a:xfrm>
+          <a:prstGeom prst="straightConnector1">
+            <a:avLst/>
+          </a:prstGeom>
+          <a:ln w="12700" cmpd="sng">
+            <a:solidFill>
+              <a:schemeClr val="tx1"/>
+            </a:solidFill>
+            <a:prstDash val="solid"/>
+            <a:tailEnd type="arrow"/>
+          </a:ln>
+        </p:spPr>
+        <p:style>
+          <a:lnRef idx="1">
+            <a:schemeClr val="accent1"/>
+          </a:lnRef>
+          <a:fillRef idx="0">
+            <a:schemeClr val="accent1"/>
+          </a:fillRef>
+          <a:effectRef idx="0">
+            <a:schemeClr val="accent1"/>
+          </a:effectRef>
+          <a:fontRef idx="minor">
+            <a:schemeClr val="tx1"/>
+          </a:fontRef>
+        </p:style>
+      </p:cxnSp>
+      <p:sp>
+        <p:nvSpPr>
+          <p:cNvPr id="21" name="Flowchart: Data 20"/>
+          <p:cNvSpPr/>
+          <p:nvPr/>
+        </p:nvSpPr>
+        <p:spPr>
+          <a:xfrm>
+            <a:off x="4314681" y="3495186"/>
+            <a:ext cx="2504154" cy="841266"/>
+          </a:xfrm>
+          <a:prstGeom prst="flowChartInputOutput">
+            <a:avLst/>
+          </a:prstGeom>
+          <a:gradFill>
+            <a:gsLst>
+              <a:gs pos="0">
+                <a:srgbClr val="7B32B2"/>
+              </a:gs>
+              <a:gs pos="100000">
+                <a:srgbClr val="401A5D"/>
+              </a:gs>
+            </a:gsLst>
+            <a:lin ang="5400000" scaled="0"/>
+          </a:gradFill>
+          <a:ln w="12700" cmpd="sng">
+            <a:solidFill>
+              <a:schemeClr val="tx1"/>
+            </a:solidFill>
+            <a:prstDash val="solid"/>
+          </a:ln>
+        </p:spPr>
+        <p:style>
+          <a:lnRef idx="2">
+            <a:schemeClr val="accent1">
+              <a:shade val="50000"/>
+            </a:schemeClr>
+          </a:lnRef>
+          <a:fillRef idx="1">
+            <a:schemeClr val="accent1"/>
+          </a:fillRef>
+          <a:effectRef idx="0">
+            <a:schemeClr val="accent1"/>
+          </a:effectRef>
+          <a:fontRef idx="minor">
+            <a:schemeClr val="lt1"/>
+          </a:fontRef>
+        </p:style>
+        <p:txBody>
+          <a:bodyPr rtlCol="0" anchor="ctr"/>
+          <a:lstStyle/>
+          <a:p>
+            <a:r>
+              <a:rPr lang="en-GB" dirty="0">
+                <a:latin typeface="Times New Roman" panose="02020603050405020304" charset="0"/>
+                <a:cs typeface="Times New Roman" panose="02020603050405020304" charset="0"/>
+                <a:sym typeface="+mn-ea"/>
+              </a:rPr>
+              <a:t> </a:t>
+            </a:r>
+            <a:r>
+              <a:rPr lang="en-GB" dirty="0" smtClean="0">
+                <a:latin typeface="Times New Roman" panose="02020603050405020304" charset="0"/>
+                <a:cs typeface="Times New Roman" panose="02020603050405020304" charset="0"/>
+                <a:sym typeface="+mn-ea"/>
+              </a:rPr>
+              <a:t>    Print c</a:t>
+            </a:r>
+            <a:endParaRPr lang="en-US" dirty="0">
+              <a:latin typeface="Times New Roman" panose="02020603050405020304" charset="0"/>
+              <a:cs typeface="Times New Roman" panose="02020603050405020304" charset="0"/>
+              <a:sym typeface="+mn-ea"/>
+            </a:endParaRPr>
+          </a:p>
+        </p:txBody>
+      </p:sp>
+    </p:spTree>
+    <p:extLst>
+      <p:ext uri="{BB962C8B-B14F-4D97-AF65-F5344CB8AC3E}">
+        <p14:creationId xmlns:p14="http://schemas.microsoft.com/office/powerpoint/2010/main" val="373365794"/>
+      </p:ext>
+    </p:extLst>
   </p:cSld>
   <p:clrMapOvr>
     <a:masterClrMapping/>
@@ -4238,6 +7290,8 @@
       </a:bgFillStyleLst>
     </a:fmtScheme>
   </a:themeElements>
+  <a:objectDefaults/>
+  <a:extraClrSchemeLst/>
   <a:extLst>
     <a:ext uri="{05A4C25C-085E-4340-85A3-A5531E510DB2}">
       <thm15:themeFamily xmlns:thm15="http://schemas.microsoft.com/office/thememl/2012/main" name="Office Theme" id="{62F939B6-93AF-4DB8-9C6B-D6C7DFDC589F}" vid="{4A3C46E8-61CC-4603-A589-7422A47A8E4A}"/>

</xml_diff>